<commit_message>
Slides for the seminar presentation
</commit_message>
<xml_diff>
--- a/DigsApp.pptx
+++ b/DigsApp.pptx
@@ -14,7 +14,7 @@
     <p:sldId id="256" r:id="rId5"/>
     <p:sldId id="270" r:id="rId6"/>
     <p:sldId id="277" r:id="rId7"/>
-    <p:sldId id="258" r:id="rId8"/>
+    <p:sldId id="278" r:id="rId8"/>
     <p:sldId id="275" r:id="rId9"/>
   </p:sldIdLst>
   <p:sldSz cx="12188825" cy="6858000"/>
@@ -1130,51 +1130,6 @@
         </a:p>
       </dgm:t>
     </dgm:pt>
-    <dgm:pt modelId="{4197E540-D10F-4BDA-84C9-B2027B240EEB}">
-      <dgm:prSet phldrT="[Text]"/>
-      <dgm:spPr>
-        <a:xfrm rot="17700000">
-          <a:off x="379667" y="2802844"/>
-          <a:ext cx="884708" cy="426573"/>
-        </a:xfrm>
-      </dgm:spPr>
-      <dgm:t>
-        <a:bodyPr/>
-        <a:lstStyle/>
-        <a:p>
-          <a:r>
-            <a:rPr lang="en-US" sz="3400">
-              <a:latin typeface="Calibri"/>
-              <a:ea typeface="+mn-ea"/>
-              <a:cs typeface="+mn-cs"/>
-            </a:rPr>
-            <a:t>App Design</a:t>
-          </a:r>
-        </a:p>
-      </dgm:t>
-    </dgm:pt>
-    <dgm:pt modelId="{78BB0D03-C1B0-4614-BB63-23D6CFFED62B}" type="parTrans" cxnId="{037D1ED7-9660-475E-907C-F4AD249CA9F1}">
-      <dgm:prSet/>
-      <dgm:spPr/>
-      <dgm:t>
-        <a:bodyPr/>
-        <a:lstStyle/>
-        <a:p>
-          <a:endParaRPr lang="en-US"/>
-        </a:p>
-      </dgm:t>
-    </dgm:pt>
-    <dgm:pt modelId="{6EE9F422-00AE-4222-BD4F-062656D802FD}" type="sibTrans" cxnId="{037D1ED7-9660-475E-907C-F4AD249CA9F1}">
-      <dgm:prSet/>
-      <dgm:spPr/>
-      <dgm:t>
-        <a:bodyPr/>
-        <a:lstStyle/>
-        <a:p>
-          <a:endParaRPr lang="en-US"/>
-        </a:p>
-      </dgm:t>
-    </dgm:pt>
     <dgm:pt modelId="{5A22019F-6F97-4DC3-963A-583D3D54A632}">
       <dgm:prSet phldrT="[Text]"/>
       <dgm:spPr>
@@ -1193,7 +1148,7 @@
               <a:ea typeface="+mn-ea"/>
               <a:cs typeface="+mn-cs"/>
             </a:rPr>
-            <a:t>23/10/2017</a:t>
+            <a:t>6/11/2017 </a:t>
           </a:r>
         </a:p>
       </dgm:t>
@@ -1238,7 +1193,7 @@
               <a:ea typeface="+mn-ea"/>
               <a:cs typeface="+mn-cs"/>
             </a:rPr>
-            <a:t>11/2017</a:t>
+            <a:t>12/2017 </a:t>
           </a:r>
         </a:p>
       </dgm:t>
@@ -1417,10 +1372,10 @@
             <a:t>S</a:t>
           </a:r>
           <a:r>
-            <a:rPr lang="ga-IE" b="0" i="0"/>
+            <a:rPr lang="ga-IE" b="0" i="0" err="1"/>
             <a:t>ubmission</a:t>
           </a:r>
-          <a:endParaRPr lang="en-US">
+          <a:endParaRPr lang="en-US" err="1">
             <a:latin typeface="Calibri"/>
             <a:ea typeface="+mn-ea"/>
             <a:cs typeface="+mn-cs"/>
@@ -1598,12 +1553,20 @@
         <a:lstStyle/>
         <a:p>
           <a:r>
+            <a:rPr lang="en-US" sz="3400" err="1">
+              <a:latin typeface="Calibri"/>
+              <a:ea typeface="+mn-ea"/>
+              <a:cs typeface="+mn-cs"/>
+            </a:rPr>
+            <a:t>Github</a:t>
+          </a:r>
+          <a:r>
             <a:rPr lang="en-US" sz="3400">
               <a:latin typeface="Calibri"/>
               <a:ea typeface="+mn-ea"/>
               <a:cs typeface="+mn-cs"/>
             </a:rPr>
-            <a:t>Git set up</a:t>
+            <a:t> set up</a:t>
           </a:r>
         </a:p>
       </dgm:t>
@@ -1778,8 +1741,20 @@
         <a:lstStyle/>
         <a:p>
           <a:r>
+            <a:rPr lang="ga-IE" b="0" i="0" err="1"/>
+            <a:t>Report</a:t>
+          </a:r>
+          <a:r>
             <a:rPr lang="ga-IE" b="0" i="0"/>
-            <a:t>Report / Dissertation </a:t>
+            <a:t> / </a:t>
+          </a:r>
+          <a:r>
+            <a:rPr lang="ga-IE" b="0" i="0" err="1"/>
+            <a:t>Dissertation</a:t>
+          </a:r>
+          <a:r>
+            <a:rPr lang="ga-IE" b="0" i="0"/>
+            <a:t> </a:t>
           </a:r>
           <a:endParaRPr lang="en-US">
             <a:latin typeface="Calibri"/>
@@ -1811,6 +1786,37 @@
         </a:p>
       </dgm:t>
     </dgm:pt>
+    <dgm:pt modelId="{45552EA3-41EF-4A83-B4A3-5FBD0CCD549F}">
+      <dgm:prSet phldrT="[Text]"/>
+      <dgm:spPr>
+        <a:xfrm rot="17700000">
+          <a:off x="379667" y="2802844"/>
+          <a:ext cx="884708" cy="426573"/>
+        </a:xfrm>
+      </dgm:spPr>
+      <dgm:t>
+        <a:bodyPr/>
+        <a:lstStyle/>
+        <a:p>
+          <a:r>
+            <a:rPr lang="en-US" sz="3400">
+              <a:latin typeface="Calibri"/>
+              <a:ea typeface="+mn-ea"/>
+              <a:cs typeface="+mn-cs"/>
+            </a:rPr>
+            <a:t>Architecture Research</a:t>
+          </a:r>
+        </a:p>
+      </dgm:t>
+    </dgm:pt>
+    <dgm:pt modelId="{3156BD02-524B-4C72-9732-BA5251F827DE}" type="parTrans" cxnId="{E42DE2E8-C5AD-49D8-958F-1D0837564139}">
+      <dgm:prSet/>
+      <dgm:spPr/>
+    </dgm:pt>
+    <dgm:pt modelId="{674379E2-FE9A-45FF-8BF7-AEA42E3BAA86}" type="sibTrans" cxnId="{E42DE2E8-C5AD-49D8-958F-1D0837564139}">
+      <dgm:prSet/>
+      <dgm:spPr/>
+    </dgm:pt>
     <dgm:pt modelId="{C666E99A-EA2A-4513-B163-536A725EC1D4}" type="pres">
       <dgm:prSet presAssocID="{E4EAE2BA-E6E9-47BE-90DA-7CC8F543793A}" presName="Name0" presStyleCnt="0">
         <dgm:presLayoutVars>
@@ -1847,68 +1853,68 @@
       <dgm:prSet presAssocID="{7E88C0FE-9E9F-45D8-9EB3-4AB6E6B956AA}" presName="parSpace" presStyleCnt="0"/>
       <dgm:spPr/>
     </dgm:pt>
-    <dgm:pt modelId="{839A1024-A936-4D08-B0BC-68A409DDB005}" type="pres">
-      <dgm:prSet presAssocID="{4197E540-D10F-4BDA-84C9-B2027B240EEB}" presName="desBackupLeftNorm" presStyleCnt="0"/>
+    <dgm:pt modelId="{14D0435F-35B3-446D-BDE7-CEF124EEF203}" type="pres">
+      <dgm:prSet presAssocID="{A429CBED-3A90-4F83-80A0-54E9D879E4AD}" presName="desBackupLeftNorm" presStyleCnt="0"/>
       <dgm:spPr/>
     </dgm:pt>
-    <dgm:pt modelId="{55BD4C78-87DC-4736-B825-D9BEF6A89DBD}" type="pres">
-      <dgm:prSet presAssocID="{4197E540-D10F-4BDA-84C9-B2027B240EEB}" presName="desComposite" presStyleCnt="0"/>
+    <dgm:pt modelId="{6054B794-EAD3-4721-A879-0DD090FC5251}" type="pres">
+      <dgm:prSet presAssocID="{A429CBED-3A90-4F83-80A0-54E9D879E4AD}" presName="desComposite" presStyleCnt="0"/>
       <dgm:spPr/>
     </dgm:pt>
-    <dgm:pt modelId="{C628FEE5-4D31-4B0D-A6F7-C3EE023C9DB4}" type="pres">
-      <dgm:prSet presAssocID="{4197E540-D10F-4BDA-84C9-B2027B240EEB}" presName="desCircle" presStyleLbl="node1" presStyleIdx="0" presStyleCnt="10"/>
+    <dgm:pt modelId="{480C7287-EF10-4839-81C7-F1551743E8FE}" type="pres">
+      <dgm:prSet presAssocID="{A429CBED-3A90-4F83-80A0-54E9D879E4AD}" presName="desCircle" presStyleLbl="node1" presStyleIdx="0" presStyleCnt="10"/>
       <dgm:spPr/>
     </dgm:pt>
-    <dgm:pt modelId="{367A6D1F-D361-45FA-B359-5D5D0A8B1592}" type="pres">
-      <dgm:prSet presAssocID="{4197E540-D10F-4BDA-84C9-B2027B240EEB}" presName="chTx" presStyleLbl="revTx" presStyleIdx="1" presStyleCnt="26"/>
+    <dgm:pt modelId="{A929E7E0-9B5C-4B0E-AF08-39FE30DEC820}" type="pres">
+      <dgm:prSet presAssocID="{A429CBED-3A90-4F83-80A0-54E9D879E4AD}" presName="chTx" presStyleLbl="revTx" presStyleIdx="1" presStyleCnt="26"/>
       <dgm:spPr/>
     </dgm:pt>
-    <dgm:pt modelId="{46640E43-992C-4ED9-AF3F-C0577B6F2603}" type="pres">
-      <dgm:prSet presAssocID="{4197E540-D10F-4BDA-84C9-B2027B240EEB}" presName="desTx" presStyleLbl="revTx" presStyleIdx="2" presStyleCnt="26">
+    <dgm:pt modelId="{7E64CA61-BFBB-43DF-B078-D64534EEDC4E}" type="pres">
+      <dgm:prSet presAssocID="{A429CBED-3A90-4F83-80A0-54E9D879E4AD}" presName="desTx" presStyleLbl="revTx" presStyleIdx="2" presStyleCnt="26">
         <dgm:presLayoutVars>
           <dgm:bulletEnabled val="1"/>
         </dgm:presLayoutVars>
       </dgm:prSet>
       <dgm:spPr/>
     </dgm:pt>
-    <dgm:pt modelId="{F1B4414F-35C7-47FA-BB64-EAB0C26155C3}" type="pres">
-      <dgm:prSet presAssocID="{4197E540-D10F-4BDA-84C9-B2027B240EEB}" presName="desBackupRightNorm" presStyleCnt="0"/>
+    <dgm:pt modelId="{6A691F31-4ADD-48C4-B399-81347E192722}" type="pres">
+      <dgm:prSet presAssocID="{A429CBED-3A90-4F83-80A0-54E9D879E4AD}" presName="desBackupRightNorm" presStyleCnt="0"/>
       <dgm:spPr/>
     </dgm:pt>
-    <dgm:pt modelId="{967D6500-1973-45B1-A7A6-294A084A4932}" type="pres">
-      <dgm:prSet presAssocID="{6EE9F422-00AE-4222-BD4F-062656D802FD}" presName="desSpace" presStyleCnt="0"/>
+    <dgm:pt modelId="{FD839B45-080D-4052-B2FE-B139B18C1ED7}" type="pres">
+      <dgm:prSet presAssocID="{A4005031-FAB1-4E4B-BD9A-E391A1DEABE5}" presName="desSpace" presStyleCnt="0"/>
       <dgm:spPr/>
     </dgm:pt>
-    <dgm:pt modelId="{14D0435F-35B3-446D-BDE7-CEF124EEF203}" type="pres">
-      <dgm:prSet presAssocID="{A429CBED-3A90-4F83-80A0-54E9D879E4AD}" presName="desBackupLeftNorm" presStyleCnt="0"/>
+    <dgm:pt modelId="{D43BEEF9-C53D-4A01-B40B-F1F6288BB8A9}" type="pres">
+      <dgm:prSet presAssocID="{45552EA3-41EF-4A83-B4A3-5FBD0CCD549F}" presName="desBackupLeftNorm" presStyleCnt="0"/>
       <dgm:spPr/>
     </dgm:pt>
-    <dgm:pt modelId="{6054B794-EAD3-4721-A879-0DD090FC5251}" type="pres">
-      <dgm:prSet presAssocID="{A429CBED-3A90-4F83-80A0-54E9D879E4AD}" presName="desComposite" presStyleCnt="0"/>
+    <dgm:pt modelId="{201AD489-A05C-4B86-96A6-9FBCDF3D25BB}" type="pres">
+      <dgm:prSet presAssocID="{45552EA3-41EF-4A83-B4A3-5FBD0CCD549F}" presName="desComposite" presStyleCnt="0"/>
       <dgm:spPr/>
     </dgm:pt>
-    <dgm:pt modelId="{480C7287-EF10-4839-81C7-F1551743E8FE}" type="pres">
-      <dgm:prSet presAssocID="{A429CBED-3A90-4F83-80A0-54E9D879E4AD}" presName="desCircle" presStyleLbl="node1" presStyleIdx="1" presStyleCnt="10"/>
+    <dgm:pt modelId="{67234606-A339-4F99-97DB-D2EA2214BB83}" type="pres">
+      <dgm:prSet presAssocID="{45552EA3-41EF-4A83-B4A3-5FBD0CCD549F}" presName="desCircle" presStyleLbl="node1" presStyleIdx="1" presStyleCnt="10"/>
       <dgm:spPr/>
     </dgm:pt>
-    <dgm:pt modelId="{A929E7E0-9B5C-4B0E-AF08-39FE30DEC820}" type="pres">
-      <dgm:prSet presAssocID="{A429CBED-3A90-4F83-80A0-54E9D879E4AD}" presName="chTx" presStyleLbl="revTx" presStyleIdx="3" presStyleCnt="26"/>
+    <dgm:pt modelId="{D512BE6F-E7AA-4560-8ABE-AFAD413773C3}" type="pres">
+      <dgm:prSet presAssocID="{45552EA3-41EF-4A83-B4A3-5FBD0CCD549F}" presName="chTx" presStyleLbl="revTx" presStyleIdx="3" presStyleCnt="26"/>
       <dgm:spPr/>
     </dgm:pt>
-    <dgm:pt modelId="{7E64CA61-BFBB-43DF-B078-D64534EEDC4E}" type="pres">
-      <dgm:prSet presAssocID="{A429CBED-3A90-4F83-80A0-54E9D879E4AD}" presName="desTx" presStyleLbl="revTx" presStyleIdx="4" presStyleCnt="26">
+    <dgm:pt modelId="{517D5028-08F4-4188-BA98-D2A9B38D2ED8}" type="pres">
+      <dgm:prSet presAssocID="{45552EA3-41EF-4A83-B4A3-5FBD0CCD549F}" presName="desTx" presStyleLbl="revTx" presStyleIdx="4" presStyleCnt="26">
         <dgm:presLayoutVars>
           <dgm:bulletEnabled val="1"/>
         </dgm:presLayoutVars>
       </dgm:prSet>
       <dgm:spPr/>
     </dgm:pt>
-    <dgm:pt modelId="{6A691F31-4ADD-48C4-B399-81347E192722}" type="pres">
-      <dgm:prSet presAssocID="{A429CBED-3A90-4F83-80A0-54E9D879E4AD}" presName="desBackupRightNorm" presStyleCnt="0"/>
+    <dgm:pt modelId="{95353E04-7A24-48F1-B22F-EAAFA535E0A8}" type="pres">
+      <dgm:prSet presAssocID="{45552EA3-41EF-4A83-B4A3-5FBD0CCD549F}" presName="desBackupRightNorm" presStyleCnt="0"/>
       <dgm:spPr/>
     </dgm:pt>
-    <dgm:pt modelId="{FD839B45-080D-4052-B2FE-B139B18C1ED7}" type="pres">
-      <dgm:prSet presAssocID="{A4005031-FAB1-4E4B-BD9A-E391A1DEABE5}" presName="desSpace" presStyleCnt="0"/>
+    <dgm:pt modelId="{0B01D61F-2702-4FA5-876F-3599003D0B1C}" type="pres">
+      <dgm:prSet presAssocID="{674379E2-FE9A-45FF-8BF7-AEA42E3BAA86}" presName="desSpace" presStyleCnt="0"/>
       <dgm:spPr/>
     </dgm:pt>
     <dgm:pt modelId="{C15A6055-885F-4223-8889-DE40F9C71E47}" type="pres">
@@ -2336,13 +2342,13 @@
     <dgm:cxn modelId="{34488931-96C4-4A48-9AF4-D99DA12E3C16}" type="presOf" srcId="{4270397F-DBF8-4AC4-AA3F-CA10089E7FBE}" destId="{31799780-C26C-41A7-A8A3-0C5BAE591647}" srcOrd="0" destOrd="0" presId="urn:microsoft.com/office/officeart/2008/layout/CircleAccentTimeline"/>
     <dgm:cxn modelId="{59B5F25D-30E8-4569-8419-4CD75F6417C0}" type="presOf" srcId="{65A643D8-FAD8-427F-B77E-324519DFF77F}" destId="{DB665163-915F-40A6-83DE-D9E80507F79D}" srcOrd="0" destOrd="0" presId="urn:microsoft.com/office/officeart/2008/layout/CircleAccentTimeline"/>
     <dgm:cxn modelId="{7B499043-54DA-41CA-902C-2E1F7343C8CF}" type="presOf" srcId="{E4EAE2BA-E6E9-47BE-90DA-7CC8F543793A}" destId="{C666E99A-EA2A-4513-B163-536A725EC1D4}" srcOrd="0" destOrd="0" presId="urn:microsoft.com/office/officeart/2008/layout/CircleAccentTimeline"/>
+    <dgm:cxn modelId="{A1E31C45-26A8-4A22-B6AC-A76CC11F3A9A}" type="presOf" srcId="{45552EA3-41EF-4A83-B4A3-5FBD0CCD549F}" destId="{D512BE6F-E7AA-4560-8ABE-AFAD413773C3}" srcOrd="0" destOrd="0" presId="urn:microsoft.com/office/officeart/2008/layout/CircleAccentTimeline"/>
     <dgm:cxn modelId="{9E4E564B-7449-488A-A98A-627F84C86B7B}" srcId="{7FC2D584-30A6-449E-B7CA-341F5F62FAF5}" destId="{4270397F-DBF8-4AC4-AA3F-CA10089E7FBE}" srcOrd="1" destOrd="0" parTransId="{75FF98B8-82E9-41E5-83D6-CFAB184BF2CA}" sibTransId="{4C7CC020-5C91-4D36-A3D2-5B6892F678CD}"/>
     <dgm:cxn modelId="{DE067B6E-5705-40C5-95E8-34489ECF6FE3}" srcId="{110704F8-F0E8-46E5-84A8-0E60557C523E}" destId="{8A6DB3FE-C39B-447E-9F35-B0AA149632E9}" srcOrd="0" destOrd="0" parTransId="{59337257-76BB-40A8-A3C4-453905802E16}" sibTransId="{092AA806-E93B-48B2-8CC6-74C5945CE54C}"/>
-    <dgm:cxn modelId="{C693CA6E-3AB6-4A64-B902-0C6726D96806}" srcId="{28E50F4E-A211-4387-B97C-8204D2D63C7E}" destId="{A429CBED-3A90-4F83-80A0-54E9D879E4AD}" srcOrd="1" destOrd="0" parTransId="{B6743256-4784-42B4-B42E-697E5CD7886B}" sibTransId="{A4005031-FAB1-4E4B-BD9A-E391A1DEABE5}"/>
+    <dgm:cxn modelId="{C693CA6E-3AB6-4A64-B902-0C6726D96806}" srcId="{28E50F4E-A211-4387-B97C-8204D2D63C7E}" destId="{A429CBED-3A90-4F83-80A0-54E9D879E4AD}" srcOrd="0" destOrd="0" parTransId="{B6743256-4784-42B4-B42E-697E5CD7886B}" sibTransId="{A4005031-FAB1-4E4B-BD9A-E391A1DEABE5}"/>
     <dgm:cxn modelId="{AA493673-DAC7-4571-B247-A7E1C831035C}" srcId="{C4843CC7-1E96-4B59-9DC6-ACB4F823B6CA}" destId="{EA1701F6-7B57-4B04-9E00-64FC8D153085}" srcOrd="0" destOrd="0" parTransId="{A6530B81-68FB-4CB6-934B-339EA4E796B5}" sibTransId="{7CDBA56F-B9FD-42B0-9B00-3DC230E39858}"/>
     <dgm:cxn modelId="{14650854-4170-4942-A8CA-8BDABCA8AAC5}" type="presOf" srcId="{8A6DB3FE-C39B-447E-9F35-B0AA149632E9}" destId="{C289158A-F0C2-472A-B26B-AE3903472886}" srcOrd="0" destOrd="0" presId="urn:microsoft.com/office/officeart/2008/layout/CircleAccentTimeline"/>
     <dgm:cxn modelId="{283F8578-61AB-4F3A-B8D5-79928B6E421A}" srcId="{E4EAE2BA-E6E9-47BE-90DA-7CC8F543793A}" destId="{7FC2D584-30A6-449E-B7CA-341F5F62FAF5}" srcOrd="2" destOrd="0" parTransId="{5B8A5422-3BF7-4359-9198-DC33B9CC121C}" sibTransId="{9BCC6C0B-54DD-42A5-A6A4-57FEEA70C7B5}"/>
-    <dgm:cxn modelId="{D5B5395A-39C2-4546-948E-FA5143119F79}" type="presOf" srcId="{4197E540-D10F-4BDA-84C9-B2027B240EEB}" destId="{367A6D1F-D361-45FA-B359-5D5D0A8B1592}" srcOrd="0" destOrd="0" presId="urn:microsoft.com/office/officeart/2008/layout/CircleAccentTimeline"/>
     <dgm:cxn modelId="{3603CE7F-B3FC-4746-835B-FEBA7784AF37}" srcId="{7FC2D584-30A6-449E-B7CA-341F5F62FAF5}" destId="{65A643D8-FAD8-427F-B77E-324519DFF77F}" srcOrd="0" destOrd="0" parTransId="{9B490BD3-91C5-4AD9-B795-4720D22F1C89}" sibTransId="{A1CFAE85-B44C-4654-BCFF-0F4929233B2A}"/>
     <dgm:cxn modelId="{39AF9F84-592C-4715-B816-2A454335FA6D}" srcId="{E4EAE2BA-E6E9-47BE-90DA-7CC8F543793A}" destId="{5A22019F-6F97-4DC3-963A-583D3D54A632}" srcOrd="1" destOrd="0" parTransId="{B9D94E7B-0198-4684-BCA7-D1F15AB8F901}" sibTransId="{40C46F67-A448-4DFF-9ACB-C354C5196E83}"/>
     <dgm:cxn modelId="{206D308C-91C0-49F1-BED4-8741502C4752}" type="presOf" srcId="{5C3FE729-CF54-47E8-BC9F-AA1DF48CD73A}" destId="{56710B5F-5133-4DCE-A6B6-89709A7A7F5F}" srcOrd="0" destOrd="0" presId="urn:microsoft.com/office/officeart/2008/layout/CircleAccentTimeline"/>
@@ -2350,10 +2356,10 @@
     <dgm:cxn modelId="{B4B25CA1-CE95-45E6-AB63-0DF1EBA23F1D}" type="presOf" srcId="{EA1701F6-7B57-4B04-9E00-64FC8D153085}" destId="{C74C4CD4-620A-4D12-877A-4F2671E6851F}" srcOrd="0" destOrd="0" presId="urn:microsoft.com/office/officeart/2008/layout/CircleAccentTimeline"/>
     <dgm:cxn modelId="{8A722DB8-690F-4486-8D68-C5FBE3FBBBBD}" srcId="{5A22019F-6F97-4DC3-963A-583D3D54A632}" destId="{0AE14328-0EE2-49D7-98C5-68FCA23BDFFA}" srcOrd="0" destOrd="0" parTransId="{EA9DC085-EAD3-474C-B8A0-5119234F5699}" sibTransId="{5E40F6E7-1E16-499D-BD19-570269F4F62E}"/>
     <dgm:cxn modelId="{49A1ACCB-AF4F-4B6D-9100-686001108783}" srcId="{E4EAE2BA-E6E9-47BE-90DA-7CC8F543793A}" destId="{110704F8-F0E8-46E5-84A8-0E60557C523E}" srcOrd="4" destOrd="0" parTransId="{167FA3FB-D320-4FDE-9A95-A1ACE2BC1E3A}" sibTransId="{2218CBE3-1C63-4178-8844-A993BC14726D}"/>
-    <dgm:cxn modelId="{037D1ED7-9660-475E-907C-F4AD249CA9F1}" srcId="{28E50F4E-A211-4387-B97C-8204D2D63C7E}" destId="{4197E540-D10F-4BDA-84C9-B2027B240EEB}" srcOrd="0" destOrd="0" parTransId="{78BB0D03-C1B0-4614-BB63-23D6CFFED62B}" sibTransId="{6EE9F422-00AE-4222-BD4F-062656D802FD}"/>
     <dgm:cxn modelId="{A81889D7-B4F1-469E-A91B-D36894BED34C}" srcId="{E4EAE2BA-E6E9-47BE-90DA-7CC8F543793A}" destId="{C4843CC7-1E96-4B59-9DC6-ACB4F823B6CA}" srcOrd="5" destOrd="0" parTransId="{B45DE71B-8C61-4A29-BBB0-5AA953CF7542}" sibTransId="{E03609D5-4748-4E3C-8F59-7CA6A6BDD666}"/>
     <dgm:cxn modelId="{C6F2B1DC-45B7-4671-950A-8EB8536BE227}" type="presOf" srcId="{0AE14328-0EE2-49D7-98C5-68FCA23BDFFA}" destId="{BCF3A686-42B8-400D-ADAB-FFC1CE9C6893}" srcOrd="0" destOrd="0" presId="urn:microsoft.com/office/officeart/2008/layout/CircleAccentTimeline"/>
     <dgm:cxn modelId="{35C58BE4-EF2E-4098-8E49-70EC71434774}" srcId="{1EAF32EF-2685-41DE-B527-A19EA257EFF2}" destId="{5C3FE729-CF54-47E8-BC9F-AA1DF48CD73A}" srcOrd="0" destOrd="0" parTransId="{E08B593F-A65B-4961-84CF-224479AF3F87}" sibTransId="{D09E64D8-9070-42AE-9824-67BA94275049}"/>
+    <dgm:cxn modelId="{E42DE2E8-C5AD-49D8-958F-1D0837564139}" srcId="{28E50F4E-A211-4387-B97C-8204D2D63C7E}" destId="{45552EA3-41EF-4A83-B4A3-5FBD0CCD549F}" srcOrd="1" destOrd="0" parTransId="{3156BD02-524B-4C72-9732-BA5251F827DE}" sibTransId="{674379E2-FE9A-45FF-8BF7-AEA42E3BAA86}"/>
     <dgm:cxn modelId="{270815E9-4A88-4DB4-9040-920BB982ABD8}" srcId="{E4EAE2BA-E6E9-47BE-90DA-7CC8F543793A}" destId="{1EAF32EF-2685-41DE-B527-A19EA257EFF2}" srcOrd="3" destOrd="0" parTransId="{180ECF10-61BF-4891-A06A-93E397C04263}" sibTransId="{C8B63689-AE32-480F-B66B-8481F7137AF6}"/>
     <dgm:cxn modelId="{01CC88F3-B7DB-43CB-9F5B-5DDD1D198595}" srcId="{1EAF32EF-2685-41DE-B527-A19EA257EFF2}" destId="{134693BC-7E2B-4CB7-A8FA-34F3CD2DAC33}" srcOrd="1" destOrd="0" parTransId="{1464A003-BF89-47A3-BCF2-4B882F299102}" sibTransId="{46453BB2-0AD8-46A3-B371-B34E5124B456}"/>
     <dgm:cxn modelId="{72A820F8-D927-4926-AAF0-58FEBF103C82}" type="presOf" srcId="{94A0AFB5-2C46-4441-935D-FA8D1E5DB2B2}" destId="{9011FBB3-4E9E-41C8-B6C2-C302CE10AF98}" srcOrd="0" destOrd="0" presId="urn:microsoft.com/office/officeart/2008/layout/CircleAccentTimeline"/>
@@ -2364,20 +2370,20 @@
     <dgm:cxn modelId="{75D65238-6A9C-44D1-A4DC-22DA752396DB}" type="presParOf" srcId="{E2E3C590-7FC4-4000-9B21-30C11C32C517}" destId="{1BA0E56F-434D-4EE4-89C5-185FC0CE6AAD}" srcOrd="2" destOrd="0" presId="urn:microsoft.com/office/officeart/2008/layout/CircleAccentTimeline"/>
     <dgm:cxn modelId="{03BFF396-B874-4373-9B8C-3CED9A231CCB}" type="presParOf" srcId="{C666E99A-EA2A-4513-B163-536A725EC1D4}" destId="{EAEC0C39-E95A-4854-99AC-F1FAA31657FA}" srcOrd="1" destOrd="0" presId="urn:microsoft.com/office/officeart/2008/layout/CircleAccentTimeline"/>
     <dgm:cxn modelId="{BDE7E1B9-2525-4213-B687-A763C84A79AD}" type="presParOf" srcId="{C666E99A-EA2A-4513-B163-536A725EC1D4}" destId="{5744958A-2933-4B47-B6EB-7D7C8BFCEF84}" srcOrd="2" destOrd="0" presId="urn:microsoft.com/office/officeart/2008/layout/CircleAccentTimeline"/>
-    <dgm:cxn modelId="{3BDE824A-0DED-4620-A7A2-CBBD37ADD539}" type="presParOf" srcId="{C666E99A-EA2A-4513-B163-536A725EC1D4}" destId="{839A1024-A936-4D08-B0BC-68A409DDB005}" srcOrd="3" destOrd="0" presId="urn:microsoft.com/office/officeart/2008/layout/CircleAccentTimeline"/>
-    <dgm:cxn modelId="{C3DCA953-FCE2-4DD4-A886-9E9E0FC4FF1B}" type="presParOf" srcId="{C666E99A-EA2A-4513-B163-536A725EC1D4}" destId="{55BD4C78-87DC-4736-B825-D9BEF6A89DBD}" srcOrd="4" destOrd="0" presId="urn:microsoft.com/office/officeart/2008/layout/CircleAccentTimeline"/>
-    <dgm:cxn modelId="{10612332-7753-4684-B959-62D1C51CBDE1}" type="presParOf" srcId="{55BD4C78-87DC-4736-B825-D9BEF6A89DBD}" destId="{C628FEE5-4D31-4B0D-A6F7-C3EE023C9DB4}" srcOrd="0" destOrd="0" presId="urn:microsoft.com/office/officeart/2008/layout/CircleAccentTimeline"/>
-    <dgm:cxn modelId="{F15CDD0E-DC9F-4EC6-B2F1-A1426170D93D}" type="presParOf" srcId="{55BD4C78-87DC-4736-B825-D9BEF6A89DBD}" destId="{367A6D1F-D361-45FA-B359-5D5D0A8B1592}" srcOrd="1" destOrd="0" presId="urn:microsoft.com/office/officeart/2008/layout/CircleAccentTimeline"/>
-    <dgm:cxn modelId="{F45E7D48-8094-408A-8975-483BA047F5B2}" type="presParOf" srcId="{55BD4C78-87DC-4736-B825-D9BEF6A89DBD}" destId="{46640E43-992C-4ED9-AF3F-C0577B6F2603}" srcOrd="2" destOrd="0" presId="urn:microsoft.com/office/officeart/2008/layout/CircleAccentTimeline"/>
-    <dgm:cxn modelId="{8E1E1DF5-4191-4FEF-BDAC-D523D8C2CC68}" type="presParOf" srcId="{C666E99A-EA2A-4513-B163-536A725EC1D4}" destId="{F1B4414F-35C7-47FA-BB64-EAB0C26155C3}" srcOrd="5" destOrd="0" presId="urn:microsoft.com/office/officeart/2008/layout/CircleAccentTimeline"/>
-    <dgm:cxn modelId="{E51ED161-8E54-425B-B67C-936DE2F00044}" type="presParOf" srcId="{C666E99A-EA2A-4513-B163-536A725EC1D4}" destId="{967D6500-1973-45B1-A7A6-294A084A4932}" srcOrd="6" destOrd="0" presId="urn:microsoft.com/office/officeart/2008/layout/CircleAccentTimeline"/>
-    <dgm:cxn modelId="{C80C9BA3-EF50-489F-BBC4-18814457BEDF}" type="presParOf" srcId="{C666E99A-EA2A-4513-B163-536A725EC1D4}" destId="{14D0435F-35B3-446D-BDE7-CEF124EEF203}" srcOrd="7" destOrd="0" presId="urn:microsoft.com/office/officeart/2008/layout/CircleAccentTimeline"/>
-    <dgm:cxn modelId="{0D689D0F-3D72-4AD0-A2B1-0ECEC5D75B78}" type="presParOf" srcId="{C666E99A-EA2A-4513-B163-536A725EC1D4}" destId="{6054B794-EAD3-4721-A879-0DD090FC5251}" srcOrd="8" destOrd="0" presId="urn:microsoft.com/office/officeart/2008/layout/CircleAccentTimeline"/>
+    <dgm:cxn modelId="{C80C9BA3-EF50-489F-BBC4-18814457BEDF}" type="presParOf" srcId="{C666E99A-EA2A-4513-B163-536A725EC1D4}" destId="{14D0435F-35B3-446D-BDE7-CEF124EEF203}" srcOrd="3" destOrd="0" presId="urn:microsoft.com/office/officeart/2008/layout/CircleAccentTimeline"/>
+    <dgm:cxn modelId="{0D689D0F-3D72-4AD0-A2B1-0ECEC5D75B78}" type="presParOf" srcId="{C666E99A-EA2A-4513-B163-536A725EC1D4}" destId="{6054B794-EAD3-4721-A879-0DD090FC5251}" srcOrd="4" destOrd="0" presId="urn:microsoft.com/office/officeart/2008/layout/CircleAccentTimeline"/>
     <dgm:cxn modelId="{444DF83E-772A-4969-9F11-843CEE7B19E5}" type="presParOf" srcId="{6054B794-EAD3-4721-A879-0DD090FC5251}" destId="{480C7287-EF10-4839-81C7-F1551743E8FE}" srcOrd="0" destOrd="0" presId="urn:microsoft.com/office/officeart/2008/layout/CircleAccentTimeline"/>
     <dgm:cxn modelId="{51AF934C-CA6A-47F8-86D5-C43BE7B5A5CA}" type="presParOf" srcId="{6054B794-EAD3-4721-A879-0DD090FC5251}" destId="{A929E7E0-9B5C-4B0E-AF08-39FE30DEC820}" srcOrd="1" destOrd="0" presId="urn:microsoft.com/office/officeart/2008/layout/CircleAccentTimeline"/>
     <dgm:cxn modelId="{D4D05E08-5478-431C-A444-4FA40F11C199}" type="presParOf" srcId="{6054B794-EAD3-4721-A879-0DD090FC5251}" destId="{7E64CA61-BFBB-43DF-B078-D64534EEDC4E}" srcOrd="2" destOrd="0" presId="urn:microsoft.com/office/officeart/2008/layout/CircleAccentTimeline"/>
-    <dgm:cxn modelId="{2C06EDD7-B14C-463D-B176-40D0D6E8E8A7}" type="presParOf" srcId="{C666E99A-EA2A-4513-B163-536A725EC1D4}" destId="{6A691F31-4ADD-48C4-B399-81347E192722}" srcOrd="9" destOrd="0" presId="urn:microsoft.com/office/officeart/2008/layout/CircleAccentTimeline"/>
-    <dgm:cxn modelId="{162D1A4F-0336-419B-8FEA-DF4F6C11E9BE}" type="presParOf" srcId="{C666E99A-EA2A-4513-B163-536A725EC1D4}" destId="{FD839B45-080D-4052-B2FE-B139B18C1ED7}" srcOrd="10" destOrd="0" presId="urn:microsoft.com/office/officeart/2008/layout/CircleAccentTimeline"/>
+    <dgm:cxn modelId="{2C06EDD7-B14C-463D-B176-40D0D6E8E8A7}" type="presParOf" srcId="{C666E99A-EA2A-4513-B163-536A725EC1D4}" destId="{6A691F31-4ADD-48C4-B399-81347E192722}" srcOrd="5" destOrd="0" presId="urn:microsoft.com/office/officeart/2008/layout/CircleAccentTimeline"/>
+    <dgm:cxn modelId="{162D1A4F-0336-419B-8FEA-DF4F6C11E9BE}" type="presParOf" srcId="{C666E99A-EA2A-4513-B163-536A725EC1D4}" destId="{FD839B45-080D-4052-B2FE-B139B18C1ED7}" srcOrd="6" destOrd="0" presId="urn:microsoft.com/office/officeart/2008/layout/CircleAccentTimeline"/>
+    <dgm:cxn modelId="{80AC4CCC-299F-4D2A-B545-23B6B575560D}" type="presParOf" srcId="{C666E99A-EA2A-4513-B163-536A725EC1D4}" destId="{D43BEEF9-C53D-4A01-B40B-F1F6288BB8A9}" srcOrd="7" destOrd="0" presId="urn:microsoft.com/office/officeart/2008/layout/CircleAccentTimeline"/>
+    <dgm:cxn modelId="{78EB5C65-CC36-4A83-9254-0CB330DA0419}" type="presParOf" srcId="{C666E99A-EA2A-4513-B163-536A725EC1D4}" destId="{201AD489-A05C-4B86-96A6-9FBCDF3D25BB}" srcOrd="8" destOrd="0" presId="urn:microsoft.com/office/officeart/2008/layout/CircleAccentTimeline"/>
+    <dgm:cxn modelId="{62B16E5C-45D2-4311-9708-FD64E14E1200}" type="presParOf" srcId="{201AD489-A05C-4B86-96A6-9FBCDF3D25BB}" destId="{67234606-A339-4F99-97DB-D2EA2214BB83}" srcOrd="0" destOrd="0" presId="urn:microsoft.com/office/officeart/2008/layout/CircleAccentTimeline"/>
+    <dgm:cxn modelId="{72D794B2-8216-4A75-A977-B8358884EDDE}" type="presParOf" srcId="{201AD489-A05C-4B86-96A6-9FBCDF3D25BB}" destId="{D512BE6F-E7AA-4560-8ABE-AFAD413773C3}" srcOrd="1" destOrd="0" presId="urn:microsoft.com/office/officeart/2008/layout/CircleAccentTimeline"/>
+    <dgm:cxn modelId="{79A372A0-017F-47B2-A8F0-5EB58215E012}" type="presParOf" srcId="{201AD489-A05C-4B86-96A6-9FBCDF3D25BB}" destId="{517D5028-08F4-4188-BA98-D2A9B38D2ED8}" srcOrd="2" destOrd="0" presId="urn:microsoft.com/office/officeart/2008/layout/CircleAccentTimeline"/>
+    <dgm:cxn modelId="{F124FA10-AEBA-4868-9C3F-66AB25E1FD90}" type="presParOf" srcId="{C666E99A-EA2A-4513-B163-536A725EC1D4}" destId="{95353E04-7A24-48F1-B22F-EAAFA535E0A8}" srcOrd="9" destOrd="0" presId="urn:microsoft.com/office/officeart/2008/layout/CircleAccentTimeline"/>
+    <dgm:cxn modelId="{89E71DA3-8091-4900-A258-DBC4DC5ADB68}" type="presParOf" srcId="{C666E99A-EA2A-4513-B163-536A725EC1D4}" destId="{0B01D61F-2702-4FA5-876F-3599003D0B1C}" srcOrd="10" destOrd="0" presId="urn:microsoft.com/office/officeart/2008/layout/CircleAccentTimeline"/>
     <dgm:cxn modelId="{5E7E60EF-3F65-40FE-8454-4151F9CED020}" type="presParOf" srcId="{C666E99A-EA2A-4513-B163-536A725EC1D4}" destId="{C15A6055-885F-4223-8889-DE40F9C71E47}" srcOrd="11" destOrd="0" presId="urn:microsoft.com/office/officeart/2008/layout/CircleAccentTimeline"/>
     <dgm:cxn modelId="{2F0B2796-6027-41D9-AB09-75619194C812}" type="presParOf" srcId="{C15A6055-885F-4223-8889-DE40F9C71E47}" destId="{9125244F-CAD2-40B8-B03E-EE53F57528C6}" srcOrd="0" destOrd="0" presId="urn:microsoft.com/office/officeart/2008/layout/CircleAccentTimeline"/>
     <dgm:cxn modelId="{B9A78D57-AC02-4019-A70F-F74194841E9F}" type="presParOf" srcId="{C15A6055-885F-4223-8889-DE40F9C71E47}" destId="{7D6BBD8D-95C7-4AC1-BA07-93F97F0B736B}" srcOrd="1" destOrd="0" presId="urn:microsoft.com/office/officeart/2008/layout/CircleAccentTimeline"/>
@@ -2621,7 +2627,7 @@
         <a:ext cx="998156" cy="481034"/>
       </dsp:txXfrm>
     </dsp:sp>
-    <dsp:sp modelId="{C628FEE5-4D31-4B0D-A6F7-C3EE023C9DB4}">
+    <dsp:sp modelId="{480C7287-EF10-4839-81C7-F1551743E8FE}">
       <dsp:nvSpPr>
         <dsp:cNvPr id="0" name=""/>
         <dsp:cNvSpPr/>
@@ -2692,7 +2698,7 @@
         </a:fontRef>
       </dsp:style>
     </dsp:sp>
-    <dsp:sp modelId="{367A6D1F-D361-45FA-B359-5D5D0A8B1592}">
+    <dsp:sp modelId="{A929E7E0-9B5C-4B0E-AF08-39FE30DEC820}">
       <dsp:nvSpPr>
         <dsp:cNvPr id="0" name=""/>
         <dsp:cNvSpPr/>
@@ -2742,12 +2748,20 @@
             <a:buNone/>
           </a:pPr>
           <a:r>
+            <a:rPr lang="en-US" sz="1200" kern="1200" err="1">
+              <a:latin typeface="Calibri"/>
+              <a:ea typeface="+mn-ea"/>
+              <a:cs typeface="+mn-cs"/>
+            </a:rPr>
+            <a:t>Github</a:t>
+          </a:r>
+          <a:r>
             <a:rPr lang="en-US" sz="1200" kern="1200">
               <a:latin typeface="Calibri"/>
               <a:ea typeface="+mn-ea"/>
               <a:cs typeface="+mn-cs"/>
             </a:rPr>
-            <a:t>App Design</a:t>
+            <a:t> set up</a:t>
           </a:r>
         </a:p>
       </dsp:txBody>
@@ -2756,7 +2770,7 @@
         <a:ext cx="863452" cy="416324"/>
       </dsp:txXfrm>
     </dsp:sp>
-    <dsp:sp modelId="{46640E43-992C-4ED9-AF3F-C0577B6F2603}">
+    <dsp:sp modelId="{7E64CA61-BFBB-43DF-B078-D64534EEDC4E}">
       <dsp:nvSpPr>
         <dsp:cNvPr id="0" name=""/>
         <dsp:cNvSpPr/>
@@ -2788,7 +2802,7 @@
         <a:fontRef idx="minor"/>
       </dsp:style>
     </dsp:sp>
-    <dsp:sp modelId="{480C7287-EF10-4839-81C7-F1551743E8FE}">
+    <dsp:sp modelId="{67234606-A339-4F99-97DB-D2EA2214BB83}">
       <dsp:nvSpPr>
         <dsp:cNvPr id="0" name=""/>
         <dsp:cNvSpPr/>
@@ -2859,7 +2873,7 @@
         </a:fontRef>
       </dsp:style>
     </dsp:sp>
-    <dsp:sp modelId="{A929E7E0-9B5C-4B0E-AF08-39FE30DEC820}">
+    <dsp:sp modelId="{D512BE6F-E7AA-4560-8ABE-AFAD413773C3}">
       <dsp:nvSpPr>
         <dsp:cNvPr id="0" name=""/>
         <dsp:cNvSpPr/>
@@ -2914,7 +2928,7 @@
               <a:ea typeface="+mn-ea"/>
               <a:cs typeface="+mn-cs"/>
             </a:rPr>
-            <a:t>Git set up</a:t>
+            <a:t>Architecture Research</a:t>
           </a:r>
         </a:p>
       </dsp:txBody>
@@ -2923,7 +2937,7 @@
         <a:ext cx="863452" cy="416324"/>
       </dsp:txXfrm>
     </dsp:sp>
-    <dsp:sp modelId="{7E64CA61-BFBB-43DF-B078-D64534EEDC4E}">
+    <dsp:sp modelId="{517D5028-08F4-4188-BA98-D2A9B38D2ED8}">
       <dsp:nvSpPr>
         <dsp:cNvPr id="0" name=""/>
         <dsp:cNvSpPr/>
@@ -3083,7 +3097,7 @@
               <a:ea typeface="+mn-ea"/>
               <a:cs typeface="+mn-cs"/>
             </a:rPr>
-            <a:t>23/10/2017</a:t>
+            <a:t>6/11/2017 </a:t>
           </a:r>
         </a:p>
       </dsp:txBody>
@@ -3554,7 +3568,7 @@
               <a:ea typeface="+mn-ea"/>
               <a:cs typeface="+mn-cs"/>
             </a:rPr>
-            <a:t>11/2017</a:t>
+            <a:t>12/2017 </a:t>
           </a:r>
         </a:p>
       </dsp:txBody>
@@ -4155,8 +4169,20 @@
             <a:buNone/>
           </a:pPr>
           <a:r>
+            <a:rPr lang="ga-IE" sz="1200" b="0" i="0" kern="1200" err="1"/>
+            <a:t>Report</a:t>
+          </a:r>
+          <a:r>
             <a:rPr lang="ga-IE" sz="1200" b="0" i="0" kern="1200"/>
-            <a:t>Report / Dissertation </a:t>
+            <a:t> / </a:t>
+          </a:r>
+          <a:r>
+            <a:rPr lang="ga-IE" sz="1200" b="0" i="0" kern="1200" err="1"/>
+            <a:t>Dissertation</a:t>
+          </a:r>
+          <a:r>
+            <a:rPr lang="ga-IE" sz="1200" b="0" i="0" kern="1200"/>
+            <a:t> </a:t>
           </a:r>
           <a:endParaRPr lang="en-US" sz="1200" kern="1200">
             <a:latin typeface="Calibri"/>
@@ -4631,10 +4657,10 @@
             <a:t>S</a:t>
           </a:r>
           <a:r>
-            <a:rPr lang="ga-IE" sz="1200" b="0" i="0" kern="1200"/>
+            <a:rPr lang="ga-IE" sz="1200" b="0" i="0" kern="1200" err="1"/>
             <a:t>ubmission</a:t>
           </a:r>
-          <a:endParaRPr lang="en-US" sz="1200" kern="1200">
+          <a:endParaRPr lang="en-US" sz="1200" kern="1200" err="1">
             <a:latin typeface="Calibri"/>
             <a:ea typeface="+mn-ea"/>
             <a:cs typeface="+mn-cs"/>
@@ -6597,7 +6623,7 @@
           <a:p>
             <a:fld id="{AC8CEC3D-96F7-401F-9673-3EE7F75C9C5B}" type="datetimeFigureOut">
               <a:rPr lang="en-US"/>
-              <a:t>10/18/2017</a:t>
+              <a:t>11/5/2017</a:t>
             </a:fld>
             <a:endParaRPr/>
           </a:p>
@@ -6762,7 +6788,7 @@
           <a:p>
             <a:fld id="{F032BCF4-D26D-4DAF-9F57-FE1E61FE7935}" type="datetimeFigureOut">
               <a:rPr lang="en-US"/>
-              <a:t>10/18/2017</a:t>
+              <a:t>11/5/2017</a:t>
             </a:fld>
             <a:endParaRPr/>
           </a:p>
@@ -7557,7 +7583,7 @@
             <a:fld id="{81C93FC7-9D1A-468B-98DB-D1E8D74418D9}" type="datetimeFigureOut">
               <a:rPr lang="en-US"/>
               <a:pPr/>
-              <a:t>10/18/2017</a:t>
+              <a:t>11/5/2017</a:t>
             </a:fld>
             <a:endParaRPr/>
           </a:p>
@@ -7619,13 +7645,13 @@
   <p:clrMapOvr>
     <a:overrideClrMapping bg1="lt1" tx1="dk1" bg2="lt2" tx2="dk2" accent1="accent1" accent2="accent2" accent3="accent3" accent4="accent4" accent5="accent5" accent6="accent6" hlink="hlink" folHlink="folHlink"/>
   </p:clrMapOvr>
-  <mc:AlternateContent xmlns:mc="http://schemas.openxmlformats.org/markup-compatibility/2006" xmlns:p14="http://schemas.microsoft.com/office/powerpoint/2010/main">
-    <mc:Choice Requires="p14">
+  <mc:AlternateContent xmlns:mc="http://schemas.openxmlformats.org/markup-compatibility/2006">
+    <mc:Choice xmlns:p14="http://schemas.microsoft.com/office/powerpoint/2010/main" Requires="p14">
       <p:transition spd="med" p14:dur="700">
         <p:fade/>
       </p:transition>
     </mc:Choice>
-    <mc:Fallback xmlns="">
+    <mc:Fallback>
       <p:transition spd="med">
         <p:fade/>
       </p:transition>
@@ -7759,7 +7785,7 @@
           <a:p>
             <a:fld id="{81C93FC7-9D1A-468B-98DB-D1E8D74418D9}" type="datetimeFigureOut">
               <a:rPr lang="en-US"/>
-              <a:t>10/18/2017</a:t>
+              <a:t>11/5/2017</a:t>
             </a:fld>
             <a:endParaRPr/>
           </a:p>
@@ -7821,13 +7847,13 @@
   <p:clrMapOvr>
     <a:masterClrMapping/>
   </p:clrMapOvr>
-  <mc:AlternateContent xmlns:mc="http://schemas.openxmlformats.org/markup-compatibility/2006" xmlns:p14="http://schemas.microsoft.com/office/powerpoint/2010/main">
-    <mc:Choice Requires="p14">
+  <mc:AlternateContent xmlns:mc="http://schemas.openxmlformats.org/markup-compatibility/2006">
+    <mc:Choice xmlns:p14="http://schemas.microsoft.com/office/powerpoint/2010/main" Requires="p14">
       <p:transition spd="med" p14:dur="700">
         <p:fade/>
       </p:transition>
     </mc:Choice>
-    <mc:Fallback xmlns="">
+    <mc:Fallback>
       <p:transition spd="med">
         <p:fade/>
       </p:transition>
@@ -7971,7 +7997,7 @@
           <a:p>
             <a:fld id="{81C93FC7-9D1A-468B-98DB-D1E8D74418D9}" type="datetimeFigureOut">
               <a:rPr lang="en-US"/>
-              <a:t>10/18/2017</a:t>
+              <a:t>11/5/2017</a:t>
             </a:fld>
             <a:endParaRPr/>
           </a:p>
@@ -8033,13 +8059,13 @@
   <p:clrMapOvr>
     <a:masterClrMapping/>
   </p:clrMapOvr>
-  <mc:AlternateContent xmlns:mc="http://schemas.openxmlformats.org/markup-compatibility/2006" xmlns:p14="http://schemas.microsoft.com/office/powerpoint/2010/main">
-    <mc:Choice Requires="p14">
+  <mc:AlternateContent xmlns:mc="http://schemas.openxmlformats.org/markup-compatibility/2006">
+    <mc:Choice xmlns:p14="http://schemas.microsoft.com/office/powerpoint/2010/main" Requires="p14">
       <p:transition spd="med" p14:dur="700">
         <p:fade/>
       </p:transition>
     </mc:Choice>
-    <mc:Fallback xmlns="">
+    <mc:Fallback>
       <p:transition spd="med">
         <p:fade/>
       </p:transition>
@@ -8173,7 +8199,7 @@
           <a:p>
             <a:fld id="{81C93FC7-9D1A-468B-98DB-D1E8D74418D9}" type="datetimeFigureOut">
               <a:rPr lang="en-US"/>
-              <a:t>10/18/2017</a:t>
+              <a:t>11/5/2017</a:t>
             </a:fld>
             <a:endParaRPr/>
           </a:p>
@@ -8234,13 +8260,13 @@
   <p:clrMapOvr>
     <a:masterClrMapping/>
   </p:clrMapOvr>
-  <mc:AlternateContent xmlns:mc="http://schemas.openxmlformats.org/markup-compatibility/2006" xmlns:p14="http://schemas.microsoft.com/office/powerpoint/2010/main">
-    <mc:Choice Requires="p14">
+  <mc:AlternateContent xmlns:mc="http://schemas.openxmlformats.org/markup-compatibility/2006">
+    <mc:Choice xmlns:p14="http://schemas.microsoft.com/office/powerpoint/2010/main" Requires="p14">
       <p:transition spd="med" p14:dur="700">
         <p:fade/>
       </p:transition>
     </mc:Choice>
-    <mc:Fallback xmlns="">
+    <mc:Fallback>
       <p:transition spd="med">
         <p:fade/>
       </p:transition>
@@ -8440,7 +8466,7 @@
             <a:fld id="{81C93FC7-9D1A-468B-98DB-D1E8D74418D9}" type="datetimeFigureOut">
               <a:rPr lang="en-US"/>
               <a:pPr/>
-              <a:t>10/18/2017</a:t>
+              <a:t>11/5/2017</a:t>
             </a:fld>
             <a:endParaRPr/>
           </a:p>
@@ -8503,13 +8529,13 @@
   <p:clrMapOvr>
     <a:masterClrMapping/>
   </p:clrMapOvr>
-  <mc:AlternateContent xmlns:mc="http://schemas.openxmlformats.org/markup-compatibility/2006" xmlns:p14="http://schemas.microsoft.com/office/powerpoint/2010/main">
-    <mc:Choice Requires="p14">
+  <mc:AlternateContent xmlns:mc="http://schemas.openxmlformats.org/markup-compatibility/2006">
+    <mc:Choice xmlns:p14="http://schemas.microsoft.com/office/powerpoint/2010/main" Requires="p14">
       <p:transition spd="med" p14:dur="700">
         <p:fade/>
       </p:transition>
     </mc:Choice>
-    <mc:Fallback xmlns="">
+    <mc:Fallback>
       <p:transition spd="med">
         <p:fade/>
       </p:transition>
@@ -8745,7 +8771,7 @@
           <a:p>
             <a:fld id="{81C93FC7-9D1A-468B-98DB-D1E8D74418D9}" type="datetimeFigureOut">
               <a:rPr lang="en-US"/>
-              <a:t>10/18/2017</a:t>
+              <a:t>11/5/2017</a:t>
             </a:fld>
             <a:endParaRPr/>
           </a:p>
@@ -8807,13 +8833,13 @@
   <p:clrMapOvr>
     <a:masterClrMapping/>
   </p:clrMapOvr>
-  <mc:AlternateContent xmlns:mc="http://schemas.openxmlformats.org/markup-compatibility/2006" xmlns:p14="http://schemas.microsoft.com/office/powerpoint/2010/main">
-    <mc:Choice Requires="p14">
+  <mc:AlternateContent xmlns:mc="http://schemas.openxmlformats.org/markup-compatibility/2006">
+    <mc:Choice xmlns:p14="http://schemas.microsoft.com/office/powerpoint/2010/main" Requires="p14">
       <p:transition spd="med" p14:dur="700">
         <p:fade/>
       </p:transition>
     </mc:Choice>
-    <mc:Fallback xmlns="">
+    <mc:Fallback>
       <p:transition spd="med">
         <p:fade/>
       </p:transition>
@@ -9193,7 +9219,7 @@
           <a:p>
             <a:fld id="{81C93FC7-9D1A-468B-98DB-D1E8D74418D9}" type="datetimeFigureOut">
               <a:rPr lang="en-US"/>
-              <a:t>10/18/2017</a:t>
+              <a:t>11/5/2017</a:t>
             </a:fld>
             <a:endParaRPr/>
           </a:p>
@@ -9255,13 +9281,13 @@
   <p:clrMapOvr>
     <a:masterClrMapping/>
   </p:clrMapOvr>
-  <mc:AlternateContent xmlns:mc="http://schemas.openxmlformats.org/markup-compatibility/2006" xmlns:p14="http://schemas.microsoft.com/office/powerpoint/2010/main">
-    <mc:Choice Requires="p14">
+  <mc:AlternateContent xmlns:mc="http://schemas.openxmlformats.org/markup-compatibility/2006">
+    <mc:Choice xmlns:p14="http://schemas.microsoft.com/office/powerpoint/2010/main" Requires="p14">
       <p:transition spd="med" p14:dur="700">
         <p:fade/>
       </p:transition>
     </mc:Choice>
-    <mc:Fallback xmlns="">
+    <mc:Fallback>
       <p:transition spd="med">
         <p:fade/>
       </p:transition>
@@ -9327,7 +9353,7 @@
           <a:p>
             <a:fld id="{81C93FC7-9D1A-468B-98DB-D1E8D74418D9}" type="datetimeFigureOut">
               <a:rPr lang="en-US"/>
-              <a:t>10/18/2017</a:t>
+              <a:t>11/5/2017</a:t>
             </a:fld>
             <a:endParaRPr/>
           </a:p>
@@ -9389,13 +9415,13 @@
   <p:clrMapOvr>
     <a:masterClrMapping/>
   </p:clrMapOvr>
-  <mc:AlternateContent xmlns:mc="http://schemas.openxmlformats.org/markup-compatibility/2006" xmlns:p14="http://schemas.microsoft.com/office/powerpoint/2010/main">
-    <mc:Choice Requires="p14">
+  <mc:AlternateContent xmlns:mc="http://schemas.openxmlformats.org/markup-compatibility/2006">
+    <mc:Choice xmlns:p14="http://schemas.microsoft.com/office/powerpoint/2010/main" Requires="p14">
       <p:transition spd="med" p14:dur="700">
         <p:fade/>
       </p:transition>
     </mc:Choice>
-    <mc:Fallback xmlns="">
+    <mc:Fallback>
       <p:transition spd="med">
         <p:fade/>
       </p:transition>
@@ -9438,7 +9464,7 @@
           <a:p>
             <a:fld id="{81C93FC7-9D1A-468B-98DB-D1E8D74418D9}" type="datetimeFigureOut">
               <a:rPr lang="en-US"/>
-              <a:t>10/18/2017</a:t>
+              <a:t>11/5/2017</a:t>
             </a:fld>
             <a:endParaRPr/>
           </a:p>
@@ -9500,13 +9526,13 @@
   <p:clrMapOvr>
     <a:masterClrMapping/>
   </p:clrMapOvr>
-  <mc:AlternateContent xmlns:mc="http://schemas.openxmlformats.org/markup-compatibility/2006" xmlns:p14="http://schemas.microsoft.com/office/powerpoint/2010/main">
-    <mc:Choice Requires="p14">
+  <mc:AlternateContent xmlns:mc="http://schemas.openxmlformats.org/markup-compatibility/2006">
+    <mc:Choice xmlns:p14="http://schemas.microsoft.com/office/powerpoint/2010/main" Requires="p14">
       <p:transition spd="med" p14:dur="700">
         <p:fade/>
       </p:transition>
     </mc:Choice>
-    <mc:Fallback xmlns="">
+    <mc:Fallback>
       <p:transition spd="med">
         <p:fade/>
       </p:transition>
@@ -9740,7 +9766,7 @@
           <a:p>
             <a:fld id="{81C93FC7-9D1A-468B-98DB-D1E8D74418D9}" type="datetimeFigureOut">
               <a:rPr lang="en-US"/>
-              <a:t>10/18/2017</a:t>
+              <a:t>11/5/2017</a:t>
             </a:fld>
             <a:endParaRPr/>
           </a:p>
@@ -9802,13 +9828,13 @@
   <p:clrMapOvr>
     <a:masterClrMapping/>
   </p:clrMapOvr>
-  <mc:AlternateContent xmlns:mc="http://schemas.openxmlformats.org/markup-compatibility/2006" xmlns:p14="http://schemas.microsoft.com/office/powerpoint/2010/main">
-    <mc:Choice Requires="p14">
+  <mc:AlternateContent xmlns:mc="http://schemas.openxmlformats.org/markup-compatibility/2006">
+    <mc:Choice xmlns:p14="http://schemas.microsoft.com/office/powerpoint/2010/main" Requires="p14">
       <p:transition spd="med" p14:dur="700">
         <p:fade/>
       </p:transition>
     </mc:Choice>
-    <mc:Fallback xmlns="">
+    <mc:Fallback>
       <p:transition spd="med">
         <p:fade/>
       </p:transition>
@@ -10030,7 +10056,7 @@
           <a:p>
             <a:fld id="{81C93FC7-9D1A-468B-98DB-D1E8D74418D9}" type="datetimeFigureOut">
               <a:rPr lang="en-US"/>
-              <a:t>10/18/2017</a:t>
+              <a:t>11/5/2017</a:t>
             </a:fld>
             <a:endParaRPr/>
           </a:p>
@@ -10092,13 +10118,13 @@
   <p:clrMapOvr>
     <a:masterClrMapping/>
   </p:clrMapOvr>
-  <mc:AlternateContent xmlns:mc="http://schemas.openxmlformats.org/markup-compatibility/2006" xmlns:p14="http://schemas.microsoft.com/office/powerpoint/2010/main">
-    <mc:Choice Requires="p14">
+  <mc:AlternateContent xmlns:mc="http://schemas.openxmlformats.org/markup-compatibility/2006">
+    <mc:Choice xmlns:p14="http://schemas.microsoft.com/office/powerpoint/2010/main" Requires="p14">
       <p:transition spd="med" p14:dur="700">
         <p:fade/>
       </p:transition>
     </mc:Choice>
-    <mc:Fallback xmlns="">
+    <mc:Fallback>
       <p:transition spd="med">
         <p:fade/>
       </p:transition>
@@ -10261,7 +10287,7 @@
             <a:fld id="{81C93FC7-9D1A-468B-98DB-D1E8D74418D9}" type="datetimeFigureOut">
               <a:rPr lang="en-US" smtClean="0"/>
               <a:pPr/>
-              <a:t>10/18/2017</a:t>
+              <a:t>11/5/2017</a:t>
             </a:fld>
             <a:endParaRPr lang="en-US"/>
           </a:p>
@@ -10372,13 +10398,13 @@
     <p:sldLayoutId id="2147483658" r:id="rId10"/>
     <p:sldLayoutId id="2147483659" r:id="rId11"/>
   </p:sldLayoutIdLst>
-  <mc:AlternateContent xmlns:mc="http://schemas.openxmlformats.org/markup-compatibility/2006" xmlns:p14="http://schemas.microsoft.com/office/powerpoint/2010/main">
-    <mc:Choice Requires="p14">
+  <mc:AlternateContent xmlns:mc="http://schemas.openxmlformats.org/markup-compatibility/2006">
+    <mc:Choice xmlns:p14="http://schemas.microsoft.com/office/powerpoint/2010/main" Requires="p14">
       <p:transition spd="med" p14:dur="700">
         <p:fade/>
       </p:transition>
     </mc:Choice>
-    <mc:Fallback xmlns="">
+    <mc:Fallback>
       <p:transition spd="med">
         <p:fade/>
       </p:transition>
@@ -10717,36 +10743,6 @@
       </p:grpSpPr>
       <p:sp>
         <p:nvSpPr>
-          <p:cNvPr id="2" name="Title 1"/>
-          <p:cNvSpPr>
-            <a:spLocks noGrp="1"/>
-          </p:cNvSpPr>
-          <p:nvPr>
-            <p:ph type="ctrTitle"/>
-          </p:nvPr>
-        </p:nvSpPr>
-        <p:spPr>
-          <a:xfrm>
-            <a:off x="1171329" y="-151342"/>
-            <a:ext cx="4130675" cy="2325877"/>
-          </a:xfrm>
-        </p:spPr>
-        <p:txBody>
-          <a:bodyPr>
-            <a:normAutofit/>
-          </a:bodyPr>
-          <a:lstStyle/>
-          <a:p>
-            <a:r>
-              <a:rPr lang="en-US" sz="7200" dirty="0"/>
-              <a:t>Digs</a:t>
-            </a:r>
-            <a:endParaRPr lang="en-US" sz="7200" dirty="0" err="1"/>
-          </a:p>
-        </p:txBody>
-      </p:sp>
-      <p:sp>
-        <p:nvSpPr>
           <p:cNvPr id="3" name="Subtitle 2"/>
           <p:cNvSpPr>
             <a:spLocks noGrp="1"/>
@@ -10802,6 +10798,36 @@
           </a:p>
         </p:txBody>
       </p:sp>
+      <p:pic>
+        <p:nvPicPr>
+          <p:cNvPr id="2" name="Picture 3" descr="imageedit_2_2757692556.png">
+            <a:extLst>
+              <a:ext uri="{FF2B5EF4-FFF2-40B4-BE49-F238E27FC236}">
+                <a16:creationId xmlns:a16="http://schemas.microsoft.com/office/drawing/2014/main" id="{71E9366D-DAE2-4FEC-9B0C-DA47E34F529B}"/>
+              </a:ext>
+            </a:extLst>
+          </p:cNvPr>
+          <p:cNvPicPr>
+            <a:picLocks noChangeAspect="1"/>
+          </p:cNvPicPr>
+          <p:nvPr/>
+        </p:nvPicPr>
+        <p:blipFill>
+          <a:blip r:embed="rId3"/>
+          <a:stretch>
+            <a:fillRect/>
+          </a:stretch>
+        </p:blipFill>
+        <p:spPr>
+          <a:xfrm>
+            <a:off x="199973" y="1228725"/>
+            <a:ext cx="3752379" cy="2753846"/>
+          </a:xfrm>
+          <a:prstGeom prst="rect">
+            <a:avLst/>
+          </a:prstGeom>
+        </p:spPr>
+      </p:pic>
     </p:spTree>
     <p:extLst>
       <p:ext uri="{BB962C8B-B14F-4D97-AF65-F5344CB8AC3E}">
@@ -10812,13 +10838,13 @@
   <p:clrMapOvr>
     <a:masterClrMapping/>
   </p:clrMapOvr>
-  <mc:AlternateContent xmlns:mc="http://schemas.openxmlformats.org/markup-compatibility/2006" xmlns:p14="http://schemas.microsoft.com/office/powerpoint/2010/main">
-    <mc:Choice Requires="p14">
+  <mc:AlternateContent xmlns:mc="http://schemas.openxmlformats.org/markup-compatibility/2006">
+    <mc:Choice xmlns:p14="http://schemas.microsoft.com/office/powerpoint/2010/main" Requires="p14">
       <p:transition spd="med" p14:dur="700">
         <p:fade/>
       </p:transition>
     </mc:Choice>
-    <mc:Fallback xmlns="">
+    <mc:Fallback>
       <p:transition spd="med">
         <p:fade/>
       </p:transition>
@@ -10861,8 +10887,8 @@
           </a:xfrm>
         </p:spPr>
         <p:txBody>
-          <a:bodyPr>
-            <a:normAutofit fontScale="90000"/>
+          <a:bodyPr vert="horz" lIns="91440" tIns="45720" rIns="91440" bIns="45720" rtlCol="0" anchor="b">
+            <a:noAutofit/>
           </a:bodyPr>
           <a:lstStyle/>
           <a:p>
@@ -10884,16 +10910,6 @@
                 <a:cs typeface="+mj-ea"/>
               </a:rPr>
             </a:br>
-            <a:r>
-              <a:rPr lang="en-US">
-                <a:solidFill>
-                  <a:srgbClr val="39527B"/>
-                </a:solidFill>
-                <a:latin typeface="Corbel"/>
-                <a:cs typeface="+mj-ea"/>
-              </a:rPr>
-              <a:t>App designed to help students find suitable accommodation</a:t>
-            </a:r>
             <a:br>
               <a:rPr lang="en-US">
                 <a:solidFill>
@@ -10912,19 +10928,13 @@
                 <a:cs typeface="+mj-ea"/>
               </a:rPr>
             </a:br>
-            <a:r>
-              <a:rPr lang="en-US">
-                <a:solidFill>
-                  <a:srgbClr val="39527B"/>
-                </a:solidFill>
-              </a:rPr>
-              <a:t>Created by students for students</a:t>
-            </a:r>
             <a:br>
               <a:rPr lang="en-US">
                 <a:solidFill>
                   <a:schemeClr val="tx1"/>
                 </a:solidFill>
+                <a:latin typeface="+mj-ea"/>
+                <a:cs typeface="+mj-ea"/>
               </a:rPr>
             </a:br>
             <a:br>
@@ -10932,27 +10942,8 @@
                 <a:solidFill>
                   <a:schemeClr val="tx1"/>
                 </a:solidFill>
-              </a:rPr>
-            </a:br>
-            <a:br>
-              <a:rPr lang="en-US">
-                <a:solidFill>
-                  <a:schemeClr val="tx1"/>
-                </a:solidFill>
-              </a:rPr>
-            </a:br>
-            <a:br>
-              <a:rPr lang="en-US">
-                <a:solidFill>
-                  <a:schemeClr val="tx1"/>
-                </a:solidFill>
-              </a:rPr>
-            </a:br>
-            <a:br>
-              <a:rPr lang="en-US">
-                <a:solidFill>
-                  <a:schemeClr val="tx1"/>
-                </a:solidFill>
+                <a:latin typeface="+mj-ea"/>
+                <a:cs typeface="+mj-ea"/>
               </a:rPr>
             </a:br>
             <a:endParaRPr lang="en-US">
@@ -10963,51 +10954,212 @@
           </a:p>
         </p:txBody>
       </p:sp>
+      <p:sp>
+        <p:nvSpPr>
+          <p:cNvPr id="2" name="TextBox 1">
+            <a:extLst>
+              <a:ext uri="{FF2B5EF4-FFF2-40B4-BE49-F238E27FC236}">
+                <a16:creationId xmlns:a16="http://schemas.microsoft.com/office/drawing/2014/main" id="{37534E53-B8E6-4115-A2B4-E3395DF652D5}"/>
+              </a:ext>
+            </a:extLst>
+          </p:cNvPr>
+          <p:cNvSpPr txBox="1"/>
+          <p:nvPr/>
+        </p:nvSpPr>
+        <p:spPr>
+          <a:xfrm>
+            <a:off x="561829" y="657225"/>
+            <a:ext cx="3111796" cy="646331"/>
+          </a:xfrm>
+          <a:prstGeom prst="rect">
+            <a:avLst/>
+          </a:prstGeom>
+        </p:spPr>
+        <p:txBody>
+          <a:bodyPr rot="0" spcFirstLastPara="0" vertOverflow="overflow" horzOverflow="overflow" vert="horz" wrap="square" lIns="91440" tIns="45720" rIns="91440" bIns="45720" numCol="1" spcCol="0" rtlCol="0" fromWordArt="0" anchor="t" anchorCtr="0" forceAA="0" compatLnSpc="1">
+            <a:prstTxWarp prst="textNoShape">
+              <a:avLst/>
+            </a:prstTxWarp>
+            <a:spAutoFit/>
+          </a:bodyPr>
+          <a:lstStyle/>
+          <a:p>
+            <a:pPr algn="ctr"/>
+            <a:r>
+              <a:rPr lang="en-US" sz="3600" b="1">
+                <a:solidFill>
+                  <a:srgbClr val="39527B"/>
+                </a:solidFill>
+              </a:rPr>
+              <a:t>Introduction</a:t>
+            </a:r>
+            <a:endParaRPr lang="en-US" b="1">
+              <a:solidFill>
+                <a:srgbClr val="39527B"/>
+              </a:solidFill>
+            </a:endParaRPr>
+          </a:p>
+        </p:txBody>
+      </p:sp>
+      <p:sp>
+        <p:nvSpPr>
+          <p:cNvPr id="3" name="TextBox 2">
+            <a:extLst>
+              <a:ext uri="{FF2B5EF4-FFF2-40B4-BE49-F238E27FC236}">
+                <a16:creationId xmlns:a16="http://schemas.microsoft.com/office/drawing/2014/main" id="{D083C4A9-6F89-45FE-9862-ABA3C400B2F7}"/>
+              </a:ext>
+            </a:extLst>
+          </p:cNvPr>
+          <p:cNvSpPr txBox="1"/>
+          <p:nvPr/>
+        </p:nvSpPr>
+        <p:spPr>
+          <a:xfrm>
+            <a:off x="714784" y="1838325"/>
+            <a:ext cx="9264109" cy="3539430"/>
+          </a:xfrm>
+          <a:prstGeom prst="rect">
+            <a:avLst/>
+          </a:prstGeom>
+        </p:spPr>
+        <p:txBody>
+          <a:bodyPr rot="0" spcFirstLastPara="0" vertOverflow="overflow" horzOverflow="overflow" vert="horz" wrap="square" lIns="91440" tIns="45720" rIns="91440" bIns="45720" numCol="1" spcCol="0" rtlCol="0" fromWordArt="0" anchor="t" anchorCtr="0" forceAA="0" compatLnSpc="1">
+            <a:prstTxWarp prst="textNoShape">
+              <a:avLst/>
+            </a:prstTxWarp>
+            <a:spAutoFit/>
+          </a:bodyPr>
+          <a:lstStyle/>
+          <a:p>
+            <a:pPr marL="285750" indent="-285750">
+              <a:buFont typeface="Arial" panose="020B0604020202020204" pitchFamily="34" charset="0"/>
+              <a:buChar char="•"/>
+            </a:pPr>
+            <a:r>
+              <a:rPr lang="en-US" sz="2800">
+                <a:solidFill>
+                  <a:srgbClr val="39527B"/>
+                </a:solidFill>
+              </a:rPr>
+              <a:t>Student Accommodation App</a:t>
+            </a:r>
+          </a:p>
+          <a:p>
+            <a:pPr marL="285750" indent="-285750">
+              <a:buFont typeface="Arial" panose="020B0604020202020204" pitchFamily="34" charset="0"/>
+              <a:buChar char="•"/>
+            </a:pPr>
+            <a:endParaRPr lang="en-US" sz="2800">
+              <a:solidFill>
+                <a:srgbClr val="39527B"/>
+              </a:solidFill>
+            </a:endParaRPr>
+          </a:p>
+          <a:p>
+            <a:pPr marL="285750" indent="-285750">
+              <a:buFont typeface="Arial" panose="020B0604020202020204" pitchFamily="34" charset="0"/>
+              <a:buChar char="•"/>
+            </a:pPr>
+            <a:r>
+              <a:rPr lang="en-US" sz="2800">
+                <a:solidFill>
+                  <a:srgbClr val="39527B"/>
+                </a:solidFill>
+              </a:rPr>
+              <a:t>Helping Students find Accomodation and Roommates</a:t>
+            </a:r>
+          </a:p>
+          <a:p>
+            <a:pPr marL="285750" indent="-285750">
+              <a:buFont typeface="Arial" panose="020B0604020202020204" pitchFamily="34" charset="0"/>
+              <a:buChar char="•"/>
+            </a:pPr>
+            <a:endParaRPr lang="en-US" sz="2800">
+              <a:solidFill>
+                <a:srgbClr val="39527B"/>
+              </a:solidFill>
+            </a:endParaRPr>
+          </a:p>
+          <a:p>
+            <a:pPr marL="285750" indent="-285750">
+              <a:buFont typeface="Arial" panose="020B0604020202020204" pitchFamily="34" charset="0"/>
+              <a:buChar char="•"/>
+            </a:pPr>
+            <a:r>
+              <a:rPr lang="en-US" sz="2800">
+                <a:solidFill>
+                  <a:srgbClr val="39527B"/>
+                </a:solidFill>
+              </a:rPr>
+              <a:t>Allowing Letters to advertise properties</a:t>
+            </a:r>
+          </a:p>
+          <a:p>
+            <a:pPr marL="285750" indent="-285750">
+              <a:buFont typeface="Arial" panose="020B0604020202020204" pitchFamily="34" charset="0"/>
+              <a:buChar char="•"/>
+            </a:pPr>
+            <a:endParaRPr lang="en-US" sz="2800">
+              <a:solidFill>
+                <a:srgbClr val="39527B"/>
+              </a:solidFill>
+            </a:endParaRPr>
+          </a:p>
+          <a:p>
+            <a:pPr marL="285750" indent="-285750">
+              <a:buFont typeface="Arial" panose="020B0604020202020204" pitchFamily="34" charset="0"/>
+              <a:buChar char="•"/>
+            </a:pPr>
+            <a:r>
+              <a:rPr lang="en-US" sz="2800">
+                <a:solidFill>
+                  <a:srgbClr val="39527B"/>
+                </a:solidFill>
+              </a:rPr>
+              <a:t>Created by Students for Students</a:t>
+            </a:r>
+          </a:p>
+          <a:p>
+            <a:pPr marL="285750" indent="-285750">
+              <a:buFont typeface="Arial" panose="020B0604020202020204" pitchFamily="34" charset="0"/>
+              <a:buChar char="•"/>
+            </a:pPr>
+            <a:endParaRPr lang="en-US" sz="2800">
+              <a:solidFill>
+                <a:srgbClr val="39527B"/>
+              </a:solidFill>
+            </a:endParaRPr>
+          </a:p>
+        </p:txBody>
+      </p:sp>
       <p:pic>
         <p:nvPicPr>
-          <p:cNvPr id="1030" name="Picture 6" descr="Image result for funny house">
+          <p:cNvPr id="4" name="Picture 4">
             <a:extLst>
               <a:ext uri="{FF2B5EF4-FFF2-40B4-BE49-F238E27FC236}">
-                <a16:creationId xmlns:a16="http://schemas.microsoft.com/office/drawing/2014/main" id="{8BFD4B35-E4E5-4E12-B65D-83AC7EDB5096}"/>
+                <a16:creationId xmlns:a16="http://schemas.microsoft.com/office/drawing/2014/main" id="{65B14E8F-6603-45B3-A6BD-9A67186FADBE}"/>
               </a:ext>
             </a:extLst>
           </p:cNvPr>
           <p:cNvPicPr>
-            <a:picLocks noChangeAspect="1" noChangeArrowheads="1"/>
+            <a:picLocks noChangeAspect="1"/>
           </p:cNvPicPr>
           <p:nvPr/>
         </p:nvPicPr>
         <p:blipFill>
-          <a:blip r:embed="rId3">
-            <a:extLst>
-              <a:ext uri="{28A0092B-C50C-407E-A947-70E740481C1C}">
-                <a14:useLocalDpi xmlns:a14="http://schemas.microsoft.com/office/drawing/2010/main" val="0"/>
-              </a:ext>
-            </a:extLst>
-          </a:blip>
-          <a:srcRect/>
+          <a:blip r:embed="rId3"/>
           <a:stretch>
             <a:fillRect/>
           </a:stretch>
         </p:blipFill>
-        <p:spPr bwMode="auto">
+        <p:spPr>
           <a:xfrm>
-            <a:off x="6997454" y="3603053"/>
-            <a:ext cx="3022693" cy="2414143"/>
+            <a:off x="7220058" y="3456002"/>
+            <a:ext cx="4057086" cy="2699165"/>
           </a:xfrm>
           <a:prstGeom prst="rect">
             <a:avLst/>
           </a:prstGeom>
-          <a:noFill/>
-          <a:extLst>
-            <a:ext uri="{909E8E84-426E-40DD-AFC4-6F175D3DCCD1}">
-              <a14:hiddenFill xmlns:a14="http://schemas.microsoft.com/office/drawing/2010/main">
-                <a:solidFill>
-                  <a:srgbClr val="FFFFFF"/>
-                </a:solidFill>
-              </a14:hiddenFill>
-            </a:ext>
-          </a:extLst>
         </p:spPr>
       </p:pic>
     </p:spTree>
@@ -11020,13 +11172,13 @@
   <p:clrMapOvr>
     <a:masterClrMapping/>
   </p:clrMapOvr>
-  <mc:AlternateContent xmlns:mc="http://schemas.openxmlformats.org/markup-compatibility/2006" xmlns:p14="http://schemas.microsoft.com/office/powerpoint/2010/main">
-    <mc:Choice Requires="p14">
+  <mc:AlternateContent xmlns:mc="http://schemas.openxmlformats.org/markup-compatibility/2006">
+    <mc:Choice xmlns:p14="http://schemas.microsoft.com/office/powerpoint/2010/main" Requires="p14">
       <p:transition spd="med" p14:dur="700">
         <p:fade/>
       </p:transition>
     </mc:Choice>
-    <mc:Fallback xmlns="">
+    <mc:Fallback>
       <p:transition spd="med">
         <p:fade/>
       </p:transition>
@@ -11073,8 +11225,8 @@
           <a:lstStyle/>
           <a:p>
             <a:r>
-              <a:rPr lang="en-US"/>
-              <a:t>Objectives: </a:t>
+              <a:rPr lang="en-US" b="1"/>
+              <a:t>Objectives</a:t>
             </a:r>
           </a:p>
         </p:txBody>
@@ -11091,36 +11243,87 @@
         </p:nvSpPr>
         <p:spPr>
           <a:xfrm>
-            <a:off x="609441" y="2370221"/>
+            <a:off x="609441" y="2009775"/>
             <a:ext cx="10287000" cy="4190999"/>
           </a:xfrm>
         </p:spPr>
         <p:txBody>
-          <a:bodyPr/>
+          <a:bodyPr vert="horz" lIns="91440" tIns="45720" rIns="91440" bIns="45720" rtlCol="0" anchor="t">
+            <a:normAutofit/>
+          </a:bodyPr>
           <a:lstStyle/>
           <a:p>
             <a:r>
-              <a:rPr lang="en-US"/>
+              <a:rPr lang="en-US">
+                <a:solidFill>
+                  <a:srgbClr val="39527B"/>
+                </a:solidFill>
+              </a:rPr>
               <a:t>Users can sign in to the app with a username and password or with their Facebook/Twitter</a:t>
             </a:r>
           </a:p>
           <a:p>
             <a:r>
-              <a:rPr lang="en-US"/>
+              <a:rPr lang="en-US">
+                <a:solidFill>
+                  <a:srgbClr val="39527B"/>
+                </a:solidFill>
+              </a:rPr>
               <a:t>Upload information about available accommodations</a:t>
             </a:r>
           </a:p>
           <a:p>
             <a:r>
-              <a:rPr lang="en-US"/>
+              <a:rPr lang="en-US">
+                <a:solidFill>
+                  <a:srgbClr val="39527B"/>
+                </a:solidFill>
+              </a:rPr>
               <a:t>Search for specified house or location</a:t>
             </a:r>
           </a:p>
           <a:p>
-            <a:endParaRPr lang="en-US"/>
+            <a:r>
+              <a:rPr lang="en-US">
+                <a:solidFill>
+                  <a:srgbClr val="39527B"/>
+                </a:solidFill>
+              </a:rPr>
+              <a:t>Message Board </a:t>
+            </a:r>
           </a:p>
         </p:txBody>
       </p:sp>
+      <p:pic>
+        <p:nvPicPr>
+          <p:cNvPr id="2" name="Picture 2">
+            <a:extLst>
+              <a:ext uri="{FF2B5EF4-FFF2-40B4-BE49-F238E27FC236}">
+                <a16:creationId xmlns:a16="http://schemas.microsoft.com/office/drawing/2014/main" id="{FB05FBCC-7FEF-4564-B9A3-90D5D5EFC7E1}"/>
+              </a:ext>
+            </a:extLst>
+          </p:cNvPr>
+          <p:cNvPicPr>
+            <a:picLocks noChangeAspect="1"/>
+          </p:cNvPicPr>
+          <p:nvPr/>
+        </p:nvPicPr>
+        <p:blipFill>
+          <a:blip r:embed="rId3"/>
+          <a:stretch>
+            <a:fillRect/>
+          </a:stretch>
+        </p:blipFill>
+        <p:spPr>
+          <a:xfrm>
+            <a:off x="7321087" y="3714750"/>
+            <a:ext cx="4088276" cy="3064709"/>
+          </a:xfrm>
+          <a:prstGeom prst="rect">
+            <a:avLst/>
+          </a:prstGeom>
+        </p:spPr>
+      </p:pic>
     </p:spTree>
     <p:extLst>
       <p:ext uri="{BB962C8B-B14F-4D97-AF65-F5344CB8AC3E}">
@@ -11131,13 +11334,13 @@
   <p:clrMapOvr>
     <a:masterClrMapping/>
   </p:clrMapOvr>
-  <mc:AlternateContent xmlns:mc="http://schemas.openxmlformats.org/markup-compatibility/2006" xmlns:p14="http://schemas.microsoft.com/office/powerpoint/2010/main">
-    <mc:Choice Requires="p14">
+  <mc:AlternateContent xmlns:mc="http://schemas.openxmlformats.org/markup-compatibility/2006">
+    <mc:Choice xmlns:p14="http://schemas.microsoft.com/office/powerpoint/2010/main" Requires="p14">
       <p:transition spd="med" p14:dur="700">
         <p:fade/>
       </p:transition>
     </mc:Choice>
-    <mc:Fallback xmlns="">
+    <mc:Fallback>
       <p:transition spd="med">
         <p:fade/>
       </p:transition>
@@ -11165,104 +11368,111 @@
       </p:grpSpPr>
       <p:pic>
         <p:nvPicPr>
-          <p:cNvPr id="1036" name="Picture 12" descr="Image result for mongodb">
+          <p:cNvPr id="23" name="Picture 23">
             <a:extLst>
               <a:ext uri="{FF2B5EF4-FFF2-40B4-BE49-F238E27FC236}">
-                <a16:creationId xmlns:a16="http://schemas.microsoft.com/office/drawing/2014/main" id="{4842C08D-331C-4206-A29C-25529F520A4C}"/>
+                <a16:creationId xmlns:a16="http://schemas.microsoft.com/office/drawing/2014/main" id="{DEAFE974-D2B5-465D-98C1-5FD97BC0B8AA}"/>
               </a:ext>
             </a:extLst>
           </p:cNvPr>
           <p:cNvPicPr>
-            <a:picLocks noChangeAspect="1" noChangeArrowheads="1"/>
+            <a:picLocks noChangeAspect="1"/>
           </p:cNvPicPr>
           <p:nvPr/>
         </p:nvPicPr>
         <p:blipFill>
-          <a:blip r:embed="rId2" cstate="print">
-            <a:extLst>
-              <a:ext uri="{28A0092B-C50C-407E-A947-70E740481C1C}">
-                <a14:useLocalDpi xmlns:a14="http://schemas.microsoft.com/office/drawing/2010/main" val="0"/>
-              </a:ext>
-            </a:extLst>
-          </a:blip>
-          <a:srcRect/>
+          <a:blip r:embed="rId2"/>
           <a:stretch>
             <a:fillRect/>
           </a:stretch>
         </p:blipFill>
-        <p:spPr bwMode="auto">
+        <p:spPr>
           <a:xfrm>
-            <a:off x="513349" y="4641590"/>
-            <a:ext cx="4555550" cy="1237676"/>
+            <a:off x="7968265" y="3282308"/>
+            <a:ext cx="3892550" cy="3451595"/>
           </a:xfrm>
           <a:prstGeom prst="rect">
             <a:avLst/>
           </a:prstGeom>
-          <a:noFill/>
-          <a:extLst>
-            <a:ext uri="{909E8E84-426E-40DD-AFC4-6F175D3DCCD1}">
-              <a14:hiddenFill xmlns:a14="http://schemas.microsoft.com/office/drawing/2010/main">
-                <a:solidFill>
-                  <a:srgbClr val="FFFFFF"/>
-                </a:solidFill>
-              </a14:hiddenFill>
-            </a:ext>
-          </a:extLst>
         </p:spPr>
       </p:pic>
       <p:pic>
         <p:nvPicPr>
-          <p:cNvPr id="1038" name="Picture 14" descr="Image result for circle arrows">
+          <p:cNvPr id="25" name="Picture 25">
             <a:extLst>
               <a:ext uri="{FF2B5EF4-FFF2-40B4-BE49-F238E27FC236}">
-                <a16:creationId xmlns:a16="http://schemas.microsoft.com/office/drawing/2014/main" id="{2FCA65EF-4319-4A59-9C2E-DD996FC0B136}"/>
+                <a16:creationId xmlns:a16="http://schemas.microsoft.com/office/drawing/2014/main" id="{23C7F545-5855-4EE4-A2E8-C0B8816384DC}"/>
               </a:ext>
             </a:extLst>
           </p:cNvPr>
           <p:cNvPicPr>
-            <a:picLocks noChangeAspect="1" noChangeArrowheads="1"/>
+            <a:picLocks noChangeAspect="1"/>
           </p:cNvPicPr>
           <p:nvPr/>
         </p:nvPicPr>
         <p:blipFill>
-          <a:blip r:embed="rId3">
-            <a:extLst>
-              <a:ext uri="{28A0092B-C50C-407E-A947-70E740481C1C}">
-                <a14:useLocalDpi xmlns:a14="http://schemas.microsoft.com/office/drawing/2010/main" val="0"/>
-              </a:ext>
-            </a:extLst>
-          </a:blip>
-          <a:srcRect/>
+          <a:blip r:embed="rId3"/>
           <a:stretch>
             <a:fillRect/>
           </a:stretch>
         </p:blipFill>
-        <p:spPr bwMode="auto">
+        <p:spPr>
           <a:xfrm>
-            <a:off x="4363045" y="1929625"/>
-            <a:ext cx="2839860" cy="2839860"/>
+            <a:off x="-85703" y="2757654"/>
+            <a:ext cx="3536950" cy="4156977"/>
           </a:xfrm>
           <a:prstGeom prst="rect">
             <a:avLst/>
           </a:prstGeom>
-          <a:noFill/>
-          <a:extLst>
-            <a:ext uri="{909E8E84-426E-40DD-AFC4-6F175D3DCCD1}">
-              <a14:hiddenFill xmlns:a14="http://schemas.microsoft.com/office/drawing/2010/main">
-                <a:solidFill>
-                  <a:srgbClr val="FFFFFF"/>
-                </a:solidFill>
-              </a14:hiddenFill>
-            </a:ext>
-          </a:extLst>
         </p:spPr>
       </p:pic>
+      <p:sp>
+        <p:nvSpPr>
+          <p:cNvPr id="5" name="Text Placeholder 4">
+            <a:extLst>
+              <a:ext uri="{FF2B5EF4-FFF2-40B4-BE49-F238E27FC236}">
+                <a16:creationId xmlns:a16="http://schemas.microsoft.com/office/drawing/2014/main" id="{DDFD3344-EC00-4E04-98A3-1E68BDC2A806}"/>
+              </a:ext>
+            </a:extLst>
+          </p:cNvPr>
+          <p:cNvSpPr>
+            <a:spLocks noGrp="1"/>
+          </p:cNvSpPr>
+          <p:nvPr>
+            <p:ph type="body" idx="1"/>
+          </p:nvPr>
+        </p:nvSpPr>
+        <p:spPr>
+          <a:xfrm>
+            <a:off x="-517817" y="533995"/>
+            <a:ext cx="8231187" cy="762000"/>
+          </a:xfrm>
+        </p:spPr>
+        <p:txBody>
+          <a:bodyPr>
+            <a:normAutofit/>
+          </a:bodyPr>
+          <a:lstStyle/>
+          <a:p>
+            <a:pPr algn="ctr"/>
+            <a:r>
+              <a:rPr lang="en-US" sz="3600" b="1">
+                <a:solidFill>
+                  <a:srgbClr val="39527B"/>
+                </a:solidFill>
+                <a:latin typeface="Corbel"/>
+              </a:rPr>
+              <a:t>Architecture/Technologies</a:t>
+            </a:r>
+          </a:p>
+        </p:txBody>
+      </p:sp>
       <p:pic>
         <p:nvPicPr>
-          <p:cNvPr id="1044" name="Picture 20" descr="Image result for angular 4 logo">
+          <p:cNvPr id="9" name="Picture 20" descr="Image result for angular 4 logo">
             <a:extLst>
               <a:ext uri="{FF2B5EF4-FFF2-40B4-BE49-F238E27FC236}">
-                <a16:creationId xmlns:a16="http://schemas.microsoft.com/office/drawing/2014/main" id="{03CC9257-F222-4203-BC6D-A51DA98304F8}"/>
+                <a16:creationId xmlns:a16="http://schemas.microsoft.com/office/drawing/2014/main" id="{0BCD6C0D-460E-4822-980E-C309A0E450E5}"/>
               </a:ext>
             </a:extLst>
           </p:cNvPr>
@@ -11285,9 +11495,9 @@
           </a:stretch>
         </p:blipFill>
         <p:spPr bwMode="auto">
-          <a:xfrm>
-            <a:off x="8108383" y="685504"/>
-            <a:ext cx="2371893" cy="2488241"/>
+          <a:xfrm flipH="1">
+            <a:off x="1005838" y="3626805"/>
+            <a:ext cx="1336675" cy="1203811"/>
           </a:xfrm>
           <a:prstGeom prst="rect">
             <a:avLst/>
@@ -11306,10 +11516,10 @@
       </p:pic>
       <p:pic>
         <p:nvPicPr>
-          <p:cNvPr id="1046" name="Picture 22" descr="Image result for ionic 3 clear logo">
+          <p:cNvPr id="11" name="Picture 26" descr="Image result for node js clear logo">
             <a:extLst>
               <a:ext uri="{FF2B5EF4-FFF2-40B4-BE49-F238E27FC236}">
-                <a16:creationId xmlns:a16="http://schemas.microsoft.com/office/drawing/2014/main" id="{9C6140D9-3467-444D-9FED-296F338B29DD}"/>
+                <a16:creationId xmlns:a16="http://schemas.microsoft.com/office/drawing/2014/main" id="{03DEF53D-E1F5-4072-93D1-49406641A3D3}"/>
               </a:ext>
             </a:extLst>
           </p:cNvPr>
@@ -11333,8 +11543,8 @@
         </p:blipFill>
         <p:spPr bwMode="auto">
           <a:xfrm>
-            <a:off x="1016975" y="545431"/>
-            <a:ext cx="2628314" cy="2628314"/>
+            <a:off x="4549479" y="1877740"/>
+            <a:ext cx="3222591" cy="1611145"/>
           </a:xfrm>
           <a:prstGeom prst="rect">
             <a:avLst/>
@@ -11353,68 +11563,343 @@
       </p:pic>
       <p:pic>
         <p:nvPicPr>
-          <p:cNvPr id="1050" name="Picture 26" descr="Image result for node js clear logo">
+          <p:cNvPr id="20" name="Picture 20">
             <a:extLst>
               <a:ext uri="{FF2B5EF4-FFF2-40B4-BE49-F238E27FC236}">
-                <a16:creationId xmlns:a16="http://schemas.microsoft.com/office/drawing/2014/main" id="{276BC7AE-9BD6-46DB-868D-C7322C7F9AD0}"/>
+                <a16:creationId xmlns:a16="http://schemas.microsoft.com/office/drawing/2014/main" id="{7FDB52B7-993B-4D42-AC84-DEA984FBD82A}"/>
               </a:ext>
             </a:extLst>
           </p:cNvPr>
           <p:cNvPicPr>
-            <a:picLocks noChangeAspect="1" noChangeArrowheads="1"/>
+            <a:picLocks noChangeAspect="1"/>
           </p:cNvPicPr>
           <p:nvPr/>
         </p:nvPicPr>
         <p:blipFill>
-          <a:blip r:embed="rId6" cstate="print">
-            <a:extLst>
-              <a:ext uri="{28A0092B-C50C-407E-A947-70E740481C1C}">
-                <a14:useLocalDpi xmlns:a14="http://schemas.microsoft.com/office/drawing/2010/main" val="0"/>
-              </a:ext>
-            </a:extLst>
-          </a:blip>
-          <a:srcRect/>
+          <a:blip r:embed="rId6"/>
           <a:stretch>
             <a:fillRect/>
           </a:stretch>
         </p:blipFill>
-        <p:spPr bwMode="auto">
+        <p:spPr>
           <a:xfrm>
-            <a:off x="7232930" y="4229728"/>
-            <a:ext cx="3819672" cy="1909836"/>
+            <a:off x="10072191" y="4550473"/>
+            <a:ext cx="1237350" cy="1442391"/>
           </a:xfrm>
           <a:prstGeom prst="rect">
             <a:avLst/>
           </a:prstGeom>
-          <a:noFill/>
-          <a:extLst>
-            <a:ext uri="{909E8E84-426E-40DD-AFC4-6F175D3DCCD1}">
-              <a14:hiddenFill xmlns:a14="http://schemas.microsoft.com/office/drawing/2010/main">
-                <a:solidFill>
-                  <a:srgbClr val="FFFFFF"/>
-                </a:solidFill>
-              </a14:hiddenFill>
-            </a:ext>
-          </a:extLst>
         </p:spPr>
       </p:pic>
+      <p:sp>
+        <p:nvSpPr>
+          <p:cNvPr id="22" name="TextBox 21">
+            <a:extLst>
+              <a:ext uri="{FF2B5EF4-FFF2-40B4-BE49-F238E27FC236}">
+                <a16:creationId xmlns:a16="http://schemas.microsoft.com/office/drawing/2014/main" id="{747B4675-6946-4771-A80A-A9E92D93E92D}"/>
+              </a:ext>
+            </a:extLst>
+          </p:cNvPr>
+          <p:cNvSpPr txBox="1"/>
+          <p:nvPr/>
+        </p:nvSpPr>
+        <p:spPr>
+          <a:xfrm>
+            <a:off x="4750495" y="1819275"/>
+            <a:ext cx="2743200" cy="400110"/>
+          </a:xfrm>
+          <a:prstGeom prst="rect">
+            <a:avLst/>
+          </a:prstGeom>
+        </p:spPr>
+        <p:txBody>
+          <a:bodyPr rot="0" spcFirstLastPara="0" vertOverflow="overflow" horzOverflow="overflow" vert="horz" wrap="square" lIns="91440" tIns="45720" rIns="91440" bIns="45720" numCol="1" spcCol="0" rtlCol="0" fromWordArt="0" anchor="t" anchorCtr="0" forceAA="0" compatLnSpc="1">
+            <a:prstTxWarp prst="textNoShape">
+              <a:avLst/>
+            </a:prstTxWarp>
+            <a:spAutoFit/>
+          </a:bodyPr>
+          <a:lstStyle/>
+          <a:p>
+            <a:pPr algn="ctr"/>
+            <a:r>
+              <a:rPr lang="en-US" sz="2000" b="1">
+                <a:solidFill>
+                  <a:srgbClr val="39527B"/>
+                </a:solidFill>
+                <a:latin typeface="Corbel"/>
+              </a:rPr>
+              <a:t>Logic Tier</a:t>
+            </a:r>
+            <a:endParaRPr lang="en-US" sz="2000" b="1">
+              <a:latin typeface="Corbel"/>
+            </a:endParaRPr>
+          </a:p>
+        </p:txBody>
+      </p:sp>
+      <p:pic>
+        <p:nvPicPr>
+          <p:cNvPr id="27" name="Picture 27">
+            <a:extLst>
+              <a:ext uri="{FF2B5EF4-FFF2-40B4-BE49-F238E27FC236}">
+                <a16:creationId xmlns:a16="http://schemas.microsoft.com/office/drawing/2014/main" id="{87D67BED-DAEA-4194-AE6D-FBC3C3013EA8}"/>
+              </a:ext>
+            </a:extLst>
+          </p:cNvPr>
+          <p:cNvPicPr>
+            <a:picLocks noChangeAspect="1"/>
+          </p:cNvPicPr>
+          <p:nvPr/>
+        </p:nvPicPr>
+        <p:blipFill rotWithShape="1">
+          <a:blip r:embed="rId7"/>
+          <a:srcRect l="23543" t="1119" r="23289"/>
+          <a:stretch/>
+        </p:blipFill>
+        <p:spPr>
+          <a:xfrm>
+            <a:off x="1077650" y="4914900"/>
+            <a:ext cx="1190118" cy="1131888"/>
+          </a:xfrm>
+          <a:prstGeom prst="rect">
+            <a:avLst/>
+          </a:prstGeom>
+        </p:spPr>
+      </p:pic>
+      <p:sp>
+        <p:nvSpPr>
+          <p:cNvPr id="29" name="TextBox 28">
+            <a:extLst>
+              <a:ext uri="{FF2B5EF4-FFF2-40B4-BE49-F238E27FC236}">
+                <a16:creationId xmlns:a16="http://schemas.microsoft.com/office/drawing/2014/main" id="{F75FB398-42FE-483D-8B11-EA40FBDE03A5}"/>
+              </a:ext>
+            </a:extLst>
+          </p:cNvPr>
+          <p:cNvSpPr txBox="1"/>
+          <p:nvPr/>
+        </p:nvSpPr>
+        <p:spPr>
+          <a:xfrm>
+            <a:off x="380901" y="2629350"/>
+            <a:ext cx="2743200" cy="400110"/>
+          </a:xfrm>
+          <a:prstGeom prst="rect">
+            <a:avLst/>
+          </a:prstGeom>
+        </p:spPr>
+        <p:txBody>
+          <a:bodyPr rot="0" spcFirstLastPara="0" vertOverflow="overflow" horzOverflow="overflow" vert="horz" wrap="square" lIns="91440" tIns="45720" rIns="91440" bIns="45720" numCol="1" spcCol="0" rtlCol="0" fromWordArt="0" anchor="t" anchorCtr="0" forceAA="0" compatLnSpc="1">
+            <a:prstTxWarp prst="textNoShape">
+              <a:avLst/>
+            </a:prstTxWarp>
+            <a:spAutoFit/>
+          </a:bodyPr>
+          <a:lstStyle/>
+          <a:p>
+            <a:pPr algn="ctr"/>
+            <a:r>
+              <a:rPr lang="en-US" sz="2000" b="1">
+                <a:solidFill>
+                  <a:srgbClr val="39527B"/>
+                </a:solidFill>
+                <a:latin typeface="Corbel"/>
+              </a:rPr>
+              <a:t>Presentation Tie</a:t>
+            </a:r>
+            <a:r>
+              <a:rPr lang="en-US" sz="2000" b="1">
+                <a:solidFill>
+                  <a:srgbClr val="39527B"/>
+                </a:solidFill>
+                <a:latin typeface="Comic Sans MS"/>
+              </a:rPr>
+              <a:t>r</a:t>
+            </a:r>
+          </a:p>
+        </p:txBody>
+      </p:sp>
+      <p:sp>
+        <p:nvSpPr>
+          <p:cNvPr id="30" name="TextBox 29">
+            <a:extLst>
+              <a:ext uri="{FF2B5EF4-FFF2-40B4-BE49-F238E27FC236}">
+                <a16:creationId xmlns:a16="http://schemas.microsoft.com/office/drawing/2014/main" id="{EFABCF15-69A1-4D6C-A915-53863A868319}"/>
+              </a:ext>
+            </a:extLst>
+          </p:cNvPr>
+          <p:cNvSpPr txBox="1"/>
+          <p:nvPr/>
+        </p:nvSpPr>
+        <p:spPr>
+          <a:xfrm>
+            <a:off x="8644189" y="3390900"/>
+            <a:ext cx="2743200" cy="400110"/>
+          </a:xfrm>
+          <a:prstGeom prst="rect">
+            <a:avLst/>
+          </a:prstGeom>
+        </p:spPr>
+        <p:txBody>
+          <a:bodyPr rot="0" spcFirstLastPara="0" vertOverflow="overflow" horzOverflow="overflow" vert="horz" wrap="square" lIns="91440" tIns="45720" rIns="91440" bIns="45720" numCol="1" spcCol="0" rtlCol="0" fromWordArt="0" anchor="t" anchorCtr="0" forceAA="0" compatLnSpc="1">
+            <a:prstTxWarp prst="textNoShape">
+              <a:avLst/>
+            </a:prstTxWarp>
+            <a:spAutoFit/>
+          </a:bodyPr>
+          <a:lstStyle/>
+          <a:p>
+            <a:pPr algn="ctr"/>
+            <a:r>
+              <a:rPr lang="en-US" sz="2000" b="1">
+                <a:solidFill>
+                  <a:srgbClr val="39527B"/>
+                </a:solidFill>
+                <a:latin typeface="Corbel"/>
+              </a:rPr>
+              <a:t>Data Tier</a:t>
+            </a:r>
+          </a:p>
+        </p:txBody>
+      </p:sp>
+      <p:pic>
+        <p:nvPicPr>
+          <p:cNvPr id="2" name="Picture 2">
+            <a:extLst>
+              <a:ext uri="{FF2B5EF4-FFF2-40B4-BE49-F238E27FC236}">
+                <a16:creationId xmlns:a16="http://schemas.microsoft.com/office/drawing/2014/main" id="{6F96BEA3-0D8A-41C2-9D99-0E9F628C6393}"/>
+              </a:ext>
+            </a:extLst>
+          </p:cNvPr>
+          <p:cNvPicPr>
+            <a:picLocks noChangeAspect="1"/>
+          </p:cNvPicPr>
+          <p:nvPr/>
+        </p:nvPicPr>
+        <p:blipFill>
+          <a:blip r:embed="rId8"/>
+          <a:stretch>
+            <a:fillRect/>
+          </a:stretch>
+        </p:blipFill>
+        <p:spPr>
+          <a:xfrm>
+            <a:off x="8644187" y="5004447"/>
+            <a:ext cx="1368948" cy="819441"/>
+          </a:xfrm>
+          <a:prstGeom prst="rect">
+            <a:avLst/>
+          </a:prstGeom>
+        </p:spPr>
+      </p:pic>
+      <p:sp>
+        <p:nvSpPr>
+          <p:cNvPr id="16" name="Arrow: Up-Down 15">
+            <a:extLst>
+              <a:ext uri="{FF2B5EF4-FFF2-40B4-BE49-F238E27FC236}">
+                <a16:creationId xmlns:a16="http://schemas.microsoft.com/office/drawing/2014/main" id="{26B385B3-6C17-4016-B547-AC87C1BBF3C4}"/>
+              </a:ext>
+            </a:extLst>
+          </p:cNvPr>
+          <p:cNvSpPr/>
+          <p:nvPr/>
+        </p:nvSpPr>
+        <p:spPr>
+          <a:xfrm rot="2760000">
+            <a:off x="3760412" y="3346558"/>
+            <a:ext cx="484632" cy="1216152"/>
+          </a:xfrm>
+          <a:prstGeom prst="upDownArrow">
+            <a:avLst/>
+          </a:prstGeom>
+        </p:spPr>
+        <p:style>
+          <a:lnRef idx="2">
+            <a:schemeClr val="accent1">
+              <a:shade val="50000"/>
+            </a:schemeClr>
+          </a:lnRef>
+          <a:fillRef idx="1">
+            <a:schemeClr val="accent1"/>
+          </a:fillRef>
+          <a:effectRef idx="0">
+            <a:schemeClr val="accent1"/>
+          </a:effectRef>
+          <a:fontRef idx="minor">
+            <a:schemeClr val="lt1"/>
+          </a:fontRef>
+        </p:style>
+        <p:txBody>
+          <a:bodyPr rtlCol="0" anchor="ctr"/>
+          <a:lstStyle/>
+          <a:p>
+            <a:pPr algn="ctr"/>
+            <a:endParaRPr lang="en-US"/>
+          </a:p>
+        </p:txBody>
+      </p:sp>
+      <p:sp>
+        <p:nvSpPr>
+          <p:cNvPr id="17" name="Arrow: Up-Down 16">
+            <a:extLst>
+              <a:ext uri="{FF2B5EF4-FFF2-40B4-BE49-F238E27FC236}">
+                <a16:creationId xmlns:a16="http://schemas.microsoft.com/office/drawing/2014/main" id="{4C6BA84D-8FF8-471E-B4D0-8D1FB4893B5B}"/>
+              </a:ext>
+            </a:extLst>
+          </p:cNvPr>
+          <p:cNvSpPr/>
+          <p:nvPr/>
+        </p:nvSpPr>
+        <p:spPr>
+          <a:xfrm rot="-2220000">
+            <a:off x="7772569" y="3332226"/>
+            <a:ext cx="484632" cy="1216152"/>
+          </a:xfrm>
+          <a:prstGeom prst="upDownArrow">
+            <a:avLst/>
+          </a:prstGeom>
+        </p:spPr>
+        <p:style>
+          <a:lnRef idx="2">
+            <a:schemeClr val="accent1">
+              <a:shade val="50000"/>
+            </a:schemeClr>
+          </a:lnRef>
+          <a:fillRef idx="1">
+            <a:schemeClr val="accent1"/>
+          </a:fillRef>
+          <a:effectRef idx="0">
+            <a:schemeClr val="accent1"/>
+          </a:effectRef>
+          <a:fontRef idx="minor">
+            <a:schemeClr val="lt1"/>
+          </a:fontRef>
+        </p:style>
+        <p:txBody>
+          <a:bodyPr rtlCol="0" anchor="ctr"/>
+          <a:lstStyle/>
+          <a:p>
+            <a:pPr algn="ctr"/>
+            <a:endParaRPr lang="en-US"/>
+          </a:p>
+        </p:txBody>
+      </p:sp>
     </p:spTree>
     <p:extLst>
       <p:ext uri="{BB962C8B-B14F-4D97-AF65-F5344CB8AC3E}">
-        <p14:creationId xmlns:p14="http://schemas.microsoft.com/office/powerpoint/2010/main" val="423498839"/>
+        <p14:creationId xmlns:p14="http://schemas.microsoft.com/office/powerpoint/2010/main" val="1511890057"/>
       </p:ext>
     </p:extLst>
   </p:cSld>
   <p:clrMapOvr>
     <a:masterClrMapping/>
   </p:clrMapOvr>
-  <mc:AlternateContent xmlns:mc="http://schemas.openxmlformats.org/markup-compatibility/2006" xmlns:p14="http://schemas.microsoft.com/office/powerpoint/2010/main">
-    <mc:Choice Requires="p14">
+  <mc:AlternateContent xmlns:mc="http://schemas.openxmlformats.org/markup-compatibility/2006">
+    <mc:Choice xmlns:p14="http://schemas.microsoft.com/office/powerpoint/2010/main" Requires="p14">
       <p:transition spd="med" p14:dur="700">
         <p:fade/>
       </p:transition>
     </mc:Choice>
-    <mc:Fallback xmlns="">
+    <mc:Fallback>
       <p:transition spd="med">
         <p:fade/>
       </p:transition>
@@ -11452,8 +11937,8 @@
         </p:nvSpPr>
         <p:spPr>
           <a:xfrm>
-            <a:off x="1086471" y="2552700"/>
-            <a:ext cx="1954349" cy="719137"/>
+            <a:off x="1085850" y="2895600"/>
+            <a:ext cx="2962275" cy="616700"/>
           </a:xfrm>
         </p:spPr>
         <p:txBody>
@@ -11463,7 +11948,7 @@
           <a:lstStyle/>
           <a:p>
             <a:r>
-              <a:rPr lang="en-US" sz="2000">
+              <a:rPr lang="en-US" sz="2800">
                 <a:solidFill>
                   <a:srgbClr val="39527B"/>
                 </a:solidFill>
@@ -11489,7 +11974,7 @@
               </a:rPr>
             </a:br>
             <a:r>
-              <a:rPr lang="en-US" sz="2000">
+              <a:rPr lang="en-US" sz="2800">
                 <a:solidFill>
                   <a:srgbClr val="39527B"/>
                 </a:solidFill>
@@ -11515,12 +12000,20 @@
               </a:rPr>
             </a:br>
             <a:r>
+              <a:rPr lang="en-US" sz="2800">
+                <a:solidFill>
+                  <a:srgbClr val="39527B"/>
+                </a:solidFill>
+              </a:rPr>
+              <a:t>Weekly meetings</a:t>
+            </a:r>
+            <a:r>
               <a:rPr lang="en-US" sz="2000">
                 <a:solidFill>
                   <a:srgbClr val="39527B"/>
                 </a:solidFill>
               </a:rPr>
-              <a:t>Weekly meetings </a:t>
+              <a:t> </a:t>
             </a:r>
             <a:br>
               <a:rPr lang="en-US">
@@ -11535,28 +12028,6 @@
           </a:p>
         </p:txBody>
       </p:sp>
-      <p:graphicFrame>
-        <p:nvGraphicFramePr>
-          <p:cNvPr id="5" name="Diagram 4"/>
-          <p:cNvGraphicFramePr/>
-          <p:nvPr>
-            <p:extLst>
-              <p:ext uri="{D42A27DB-BD31-4B8C-83A1-F6EECF244321}">
-                <p14:modId xmlns:p14="http://schemas.microsoft.com/office/powerpoint/2010/main" val="3398700911"/>
-              </p:ext>
-            </p:extLst>
-          </p:nvPr>
-        </p:nvGraphicFramePr>
-        <p:xfrm>
-          <a:off x="1164596" y="1748590"/>
-          <a:ext cx="10331116" cy="5999747"/>
-        </p:xfrm>
-        <a:graphic>
-          <a:graphicData uri="http://schemas.openxmlformats.org/drawingml/2006/diagram">
-            <dgm:relIds xmlns:dgm="http://schemas.openxmlformats.org/drawingml/2006/diagram" xmlns:r="http://schemas.openxmlformats.org/officeDocument/2006/relationships" r:dm="rId2" r:lo="rId3" r:qs="rId4" r:cs="rId5"/>
-          </a:graphicData>
-        </a:graphic>
-      </p:graphicFrame>
       <p:sp>
         <p:nvSpPr>
           <p:cNvPr id="2" name="TextBox 1">
@@ -11571,7 +12042,7 @@
         </p:nvSpPr>
         <p:spPr>
           <a:xfrm>
-            <a:off x="4241800" y="495300"/>
+            <a:off x="761802" y="561975"/>
             <a:ext cx="3044825" cy="646331"/>
           </a:xfrm>
           <a:prstGeom prst="rect">
@@ -11589,7 +12060,7 @@
           <a:p>
             <a:pPr algn="ctr"/>
             <a:r>
-              <a:rPr lang="en-US" sz="3600">
+              <a:rPr lang="en-US" sz="3600" b="1">
                 <a:solidFill>
                   <a:srgbClr val="39527B"/>
                 </a:solidFill>
@@ -11599,6 +12070,58 @@
           </a:p>
         </p:txBody>
       </p:sp>
+      <p:graphicFrame>
+        <p:nvGraphicFramePr>
+          <p:cNvPr id="5" name="Diagram 4"/>
+          <p:cNvGraphicFramePr/>
+          <p:nvPr>
+            <p:extLst>
+              <p:ext uri="{D42A27DB-BD31-4B8C-83A1-F6EECF244321}">
+                <p14:modId xmlns:p14="http://schemas.microsoft.com/office/powerpoint/2010/main" val="2328032695"/>
+              </p:ext>
+            </p:extLst>
+          </p:nvPr>
+        </p:nvGraphicFramePr>
+        <p:xfrm>
+          <a:off x="1085850" y="1943100"/>
+          <a:ext cx="10331116" cy="5999747"/>
+        </p:xfrm>
+        <a:graphic>
+          <a:graphicData uri="http://schemas.openxmlformats.org/drawingml/2006/diagram">
+            <dgm:relIds xmlns:dgm="http://schemas.openxmlformats.org/drawingml/2006/diagram" xmlns:r="http://schemas.openxmlformats.org/officeDocument/2006/relationships" r:dm="rId2" r:lo="rId3" r:qs="rId4" r:cs="rId5"/>
+          </a:graphicData>
+        </a:graphic>
+      </p:graphicFrame>
+      <p:pic>
+        <p:nvPicPr>
+          <p:cNvPr id="3" name="Picture 5">
+            <a:extLst>
+              <a:ext uri="{FF2B5EF4-FFF2-40B4-BE49-F238E27FC236}">
+                <a16:creationId xmlns:a16="http://schemas.microsoft.com/office/drawing/2014/main" id="{FDCF68F1-A56B-4CFF-BB9D-B183B9B5EBCE}"/>
+              </a:ext>
+            </a:extLst>
+          </p:cNvPr>
+          <p:cNvPicPr>
+            <a:picLocks noChangeAspect="1"/>
+          </p:cNvPicPr>
+          <p:nvPr/>
+        </p:nvPicPr>
+        <p:blipFill>
+          <a:blip r:embed="rId7"/>
+          <a:stretch>
+            <a:fillRect/>
+          </a:stretch>
+        </p:blipFill>
+        <p:spPr>
+          <a:xfrm>
+            <a:off x="7313295" y="398060"/>
+            <a:ext cx="3097772" cy="2879725"/>
+          </a:xfrm>
+          <a:prstGeom prst="rect">
+            <a:avLst/>
+          </a:prstGeom>
+        </p:spPr>
+      </p:pic>
     </p:spTree>
     <p:extLst>
       <p:ext uri="{BB962C8B-B14F-4D97-AF65-F5344CB8AC3E}">
@@ -12413,15 +12936,6 @@
 </file>
 
 <file path=customXml/item1.xml><?xml version="1.0" encoding="utf-8"?>
-<?mso-contentType ?>
-<FormTemplates xmlns="http://schemas.microsoft.com/sharepoint/v3/contenttype/forms">
-  <Display>DocumentLibraryForm</Display>
-  <Edit>DocumentLibraryForm</Edit>
-  <New>DocumentLibraryForm</New>
-</FormTemplates>
-</file>
-
-<file path=customXml/item2.xml><?xml version="1.0" encoding="utf-8"?>
 <ct:contentTypeSchema xmlns:ct="http://schemas.microsoft.com/office/2006/metadata/contentType" xmlns:ma="http://schemas.microsoft.com/office/2006/metadata/properties/metaAttributes" ct:_="" ma:_="" ma:contentTypeName="Document" ma:contentTypeID="0x010100AA3F7D94069FF64A86F7DFF56D60E3BE" ma:contentTypeVersion="6" ma:contentTypeDescription="Create a new document." ma:contentTypeScope="" ma:versionID="c32302c77d4085ecf495bdddb7f5e889">
   <xsd:schema xmlns:xsd="http://www.w3.org/2001/XMLSchema" xmlns:xs="http://www.w3.org/2001/XMLSchema" xmlns:p="http://schemas.microsoft.com/office/2006/metadata/properties" xmlns:ns2="a4f35948-e619-41b3-aa29-22878b09cfd2" xmlns:ns3="40262f94-9f35-4ac3-9a90-690165a166b7" targetNamespace="http://schemas.microsoft.com/office/2006/metadata/properties" ma:root="true" ma:fieldsID="4ab5ae46be95f9d0be6107e8200be7a2" ns2:_="" ns3:_="">
     <xsd:import namespace="a4f35948-e619-41b3-aa29-22878b09cfd2"/>
@@ -12602,7 +13116,7 @@
 </ct:contentTypeSchema>
 </file>
 
-<file path=customXml/item3.xml><?xml version="1.0" encoding="utf-8"?>
+<file path=customXml/item2.xml><?xml version="1.0" encoding="utf-8"?>
 <p:properties xmlns:p="http://schemas.microsoft.com/office/2006/metadata/properties" xmlns:xsi="http://www.w3.org/2001/XMLSchema-instance" xmlns:pc="http://schemas.microsoft.com/office/infopath/2007/PartnerControls">
   <documentManagement>
     <VSO_x0020_item_x0020_id xmlns="40262f94-9f35-4ac3-9a90-690165a166b7" xsi:nil="true"/>
@@ -12613,15 +13127,16 @@
 </p:properties>
 </file>
 
-<file path=customXml/itemProps1.xml><?xml version="1.0" encoding="utf-8"?>
-<ds:datastoreItem xmlns:ds="http://schemas.openxmlformats.org/officeDocument/2006/customXml" ds:itemID="{7F9B8BCC-BF24-4800-92E1-9F891BBB27E6}">
-  <ds:schemaRefs>
-    <ds:schemaRef ds:uri="http://schemas.microsoft.com/sharepoint/v3/contenttype/forms"/>
-  </ds:schemaRefs>
-</ds:datastoreItem>
+<file path=customXml/item3.xml><?xml version="1.0" encoding="utf-8"?>
+<?mso-contentType ?>
+<FormTemplates xmlns="http://schemas.microsoft.com/sharepoint/v3/contenttype/forms">
+  <Display>DocumentLibraryForm</Display>
+  <Edit>DocumentLibraryForm</Edit>
+  <New>DocumentLibraryForm</New>
+</FormTemplates>
 </file>
 
-<file path=customXml/itemProps2.xml><?xml version="1.0" encoding="utf-8"?>
+<file path=customXml/itemProps1.xml><?xml version="1.0" encoding="utf-8"?>
 <ds:datastoreItem xmlns:ds="http://schemas.openxmlformats.org/officeDocument/2006/customXml" ds:itemID="{5CCB2C71-1ED8-4540-B003-293B5E75C71F}">
   <ds:schemaRefs>
     <ds:schemaRef ds:uri="http://schemas.microsoft.com/office/2006/metadata/contentType"/>
@@ -12640,7 +13155,7 @@
 </ds:datastoreItem>
 </file>
 
-<file path=customXml/itemProps3.xml><?xml version="1.0" encoding="utf-8"?>
+<file path=customXml/itemProps2.xml><?xml version="1.0" encoding="utf-8"?>
 <ds:datastoreItem xmlns:ds="http://schemas.openxmlformats.org/officeDocument/2006/customXml" ds:itemID="{50AACE6D-8EB6-447A-8DFD-C2C0C52916AC}">
   <ds:schemaRefs>
     <ds:schemaRef ds:uri="http://schemas.microsoft.com/office/2006/documentManagement/types"/>
@@ -12655,4 +13170,12 @@
     <ds:schemaRef ds:uri="http://purl.org/dc/terms/"/>
   </ds:schemaRefs>
 </ds:datastoreItem>
+</file>
+
+<file path=customXml/itemProps3.xml><?xml version="1.0" encoding="utf-8"?>
+<ds:datastoreItem xmlns:ds="http://schemas.openxmlformats.org/officeDocument/2006/customXml" ds:itemID="{7F9B8BCC-BF24-4800-92E1-9F891BBB27E6}">
+  <ds:schemaRefs>
+    <ds:schemaRef ds:uri="http://schemas.microsoft.com/sharepoint/v3/contenttype/forms"/>
+  </ds:schemaRefs>
+</ds:datastoreItem>
 </file>
</xml_diff>